<commit_message>
added seminar ppt contents
</commit_message>
<xml_diff>
--- a/Seminar/Dynamic Operating Envelope.pptx
+++ b/Seminar/Dynamic Operating Envelope.pptx
@@ -4,13 +4,19 @@
   <p:sldMasterIdLst>
     <p:sldMasterId id="2147483660" r:id="rId1"/>
   </p:sldMasterIdLst>
+  <p:notesMasterIdLst>
+    <p:notesMasterId r:id="rId11"/>
+  </p:notesMasterIdLst>
   <p:sldIdLst>
     <p:sldId id="256" r:id="rId2"/>
     <p:sldId id="257" r:id="rId3"/>
     <p:sldId id="258" r:id="rId4"/>
-    <p:sldId id="261" r:id="rId5"/>
-    <p:sldId id="259" r:id="rId6"/>
-    <p:sldId id="260" r:id="rId7"/>
+    <p:sldId id="260" r:id="rId5"/>
+    <p:sldId id="266" r:id="rId6"/>
+    <p:sldId id="263" r:id="rId7"/>
+    <p:sldId id="270" r:id="rId8"/>
+    <p:sldId id="271" r:id="rId9"/>
+    <p:sldId id="273" r:id="rId10"/>
   </p:sldIdLst>
   <p:sldSz cx="12192000" cy="6858000"/>
   <p:notesSz cx="6858000" cy="9144000"/>
@@ -117,6 +123,356 @@
 </p:presentation>
 </file>
 
+<file path=ppt/notesMasters/notesMaster1.xml><?xml version="1.0" encoding="utf-8"?>
+<p:notesMaster xmlns:a="http://schemas.openxmlformats.org/drawingml/2006/main" xmlns:r="http://schemas.openxmlformats.org/officeDocument/2006/relationships" xmlns:p="http://schemas.openxmlformats.org/presentationml/2006/main">
+  <p:cSld>
+    <p:bg>
+      <p:bgRef idx="1001">
+        <a:schemeClr val="bg1"/>
+      </p:bgRef>
+    </p:bg>
+    <p:spTree>
+      <p:nvGrpSpPr>
+        <p:cNvPr id="1" name=""/>
+        <p:cNvGrpSpPr/>
+        <p:nvPr/>
+      </p:nvGrpSpPr>
+      <p:grpSpPr>
+        <a:xfrm>
+          <a:off x="0" y="0"/>
+          <a:ext cx="0" cy="0"/>
+          <a:chOff x="0" y="0"/>
+          <a:chExt cx="0" cy="0"/>
+        </a:xfrm>
+      </p:grpSpPr>
+      <p:sp>
+        <p:nvSpPr>
+          <p:cNvPr id="2" name="Header Placeholder 1"/>
+          <p:cNvSpPr>
+            <a:spLocks noGrp="1"/>
+          </p:cNvSpPr>
+          <p:nvPr>
+            <p:ph type="hdr" sz="quarter"/>
+          </p:nvPr>
+        </p:nvSpPr>
+        <p:spPr>
+          <a:xfrm>
+            <a:off x="0" y="0"/>
+            <a:ext cx="2971800" cy="458788"/>
+          </a:xfrm>
+          <a:prstGeom prst="rect">
+            <a:avLst/>
+          </a:prstGeom>
+        </p:spPr>
+        <p:txBody>
+          <a:bodyPr vert="horz" lIns="91440" tIns="45720" rIns="91440" bIns="45720" rtlCol="0"/>
+          <a:lstStyle>
+            <a:lvl1pPr algn="l">
+              <a:defRPr sz="1200"/>
+            </a:lvl1pPr>
+          </a:lstStyle>
+          <a:p>
+            <a:endParaRPr lang="en-IN"/>
+          </a:p>
+        </p:txBody>
+      </p:sp>
+      <p:sp>
+        <p:nvSpPr>
+          <p:cNvPr id="3" name="Date Placeholder 2"/>
+          <p:cNvSpPr>
+            <a:spLocks noGrp="1"/>
+          </p:cNvSpPr>
+          <p:nvPr>
+            <p:ph type="dt" idx="1"/>
+          </p:nvPr>
+        </p:nvSpPr>
+        <p:spPr>
+          <a:xfrm>
+            <a:off x="3884613" y="0"/>
+            <a:ext cx="2971800" cy="458788"/>
+          </a:xfrm>
+          <a:prstGeom prst="rect">
+            <a:avLst/>
+          </a:prstGeom>
+        </p:spPr>
+        <p:txBody>
+          <a:bodyPr vert="horz" lIns="91440" tIns="45720" rIns="91440" bIns="45720" rtlCol="0"/>
+          <a:lstStyle>
+            <a:lvl1pPr algn="r">
+              <a:defRPr sz="1200"/>
+            </a:lvl1pPr>
+          </a:lstStyle>
+          <a:p>
+            <a:fld id="{729B5FF0-A2B1-4EC2-A672-90A48195984D}" type="datetimeFigureOut">
+              <a:rPr lang="en-IN" smtClean="0"/>
+              <a:t>12-04-2023</a:t>
+            </a:fld>
+            <a:endParaRPr lang="en-IN"/>
+          </a:p>
+        </p:txBody>
+      </p:sp>
+      <p:sp>
+        <p:nvSpPr>
+          <p:cNvPr id="4" name="Slide Image Placeholder 3"/>
+          <p:cNvSpPr>
+            <a:spLocks noGrp="1" noRot="1" noChangeAspect="1"/>
+          </p:cNvSpPr>
+          <p:nvPr>
+            <p:ph type="sldImg" idx="2"/>
+          </p:nvPr>
+        </p:nvSpPr>
+        <p:spPr>
+          <a:xfrm>
+            <a:off x="685800" y="1143000"/>
+            <a:ext cx="5486400" cy="3086100"/>
+          </a:xfrm>
+          <a:prstGeom prst="rect">
+            <a:avLst/>
+          </a:prstGeom>
+          <a:noFill/>
+          <a:ln w="12700">
+            <a:solidFill>
+              <a:prstClr val="black"/>
+            </a:solidFill>
+          </a:ln>
+        </p:spPr>
+        <p:txBody>
+          <a:bodyPr vert="horz" lIns="91440" tIns="45720" rIns="91440" bIns="45720" rtlCol="0" anchor="ctr"/>
+          <a:lstStyle/>
+          <a:p>
+            <a:endParaRPr lang="en-IN"/>
+          </a:p>
+        </p:txBody>
+      </p:sp>
+      <p:sp>
+        <p:nvSpPr>
+          <p:cNvPr id="5" name="Notes Placeholder 4"/>
+          <p:cNvSpPr>
+            <a:spLocks noGrp="1"/>
+          </p:cNvSpPr>
+          <p:nvPr>
+            <p:ph type="body" sz="quarter" idx="3"/>
+          </p:nvPr>
+        </p:nvSpPr>
+        <p:spPr>
+          <a:xfrm>
+            <a:off x="685800" y="4400550"/>
+            <a:ext cx="5486400" cy="3600450"/>
+          </a:xfrm>
+          <a:prstGeom prst="rect">
+            <a:avLst/>
+          </a:prstGeom>
+        </p:spPr>
+        <p:txBody>
+          <a:bodyPr vert="horz" lIns="91440" tIns="45720" rIns="91440" bIns="45720" rtlCol="0"/>
+          <a:lstStyle/>
+          <a:p>
+            <a:pPr lvl="0"/>
+            <a:r>
+              <a:rPr lang="en-US" smtClean="0"/>
+              <a:t>Click to edit Master text styles</a:t>
+            </a:r>
+          </a:p>
+          <a:p>
+            <a:pPr lvl="1"/>
+            <a:r>
+              <a:rPr lang="en-US" smtClean="0"/>
+              <a:t>Second level</a:t>
+            </a:r>
+          </a:p>
+          <a:p>
+            <a:pPr lvl="2"/>
+            <a:r>
+              <a:rPr lang="en-US" smtClean="0"/>
+              <a:t>Third level</a:t>
+            </a:r>
+          </a:p>
+          <a:p>
+            <a:pPr lvl="3"/>
+            <a:r>
+              <a:rPr lang="en-US" smtClean="0"/>
+              <a:t>Fourth level</a:t>
+            </a:r>
+          </a:p>
+          <a:p>
+            <a:pPr lvl="4"/>
+            <a:r>
+              <a:rPr lang="en-US" smtClean="0"/>
+              <a:t>Fifth level</a:t>
+            </a:r>
+            <a:endParaRPr lang="en-IN"/>
+          </a:p>
+        </p:txBody>
+      </p:sp>
+      <p:sp>
+        <p:nvSpPr>
+          <p:cNvPr id="6" name="Footer Placeholder 5"/>
+          <p:cNvSpPr>
+            <a:spLocks noGrp="1"/>
+          </p:cNvSpPr>
+          <p:nvPr>
+            <p:ph type="ftr" sz="quarter" idx="4"/>
+          </p:nvPr>
+        </p:nvSpPr>
+        <p:spPr>
+          <a:xfrm>
+            <a:off x="0" y="8685213"/>
+            <a:ext cx="2971800" cy="458787"/>
+          </a:xfrm>
+          <a:prstGeom prst="rect">
+            <a:avLst/>
+          </a:prstGeom>
+        </p:spPr>
+        <p:txBody>
+          <a:bodyPr vert="horz" lIns="91440" tIns="45720" rIns="91440" bIns="45720" rtlCol="0" anchor="b"/>
+          <a:lstStyle>
+            <a:lvl1pPr algn="l">
+              <a:defRPr sz="1200"/>
+            </a:lvl1pPr>
+          </a:lstStyle>
+          <a:p>
+            <a:endParaRPr lang="en-IN"/>
+          </a:p>
+        </p:txBody>
+      </p:sp>
+      <p:sp>
+        <p:nvSpPr>
+          <p:cNvPr id="7" name="Slide Number Placeholder 6"/>
+          <p:cNvSpPr>
+            <a:spLocks noGrp="1"/>
+          </p:cNvSpPr>
+          <p:nvPr>
+            <p:ph type="sldNum" sz="quarter" idx="5"/>
+          </p:nvPr>
+        </p:nvSpPr>
+        <p:spPr>
+          <a:xfrm>
+            <a:off x="3884613" y="8685213"/>
+            <a:ext cx="2971800" cy="458787"/>
+          </a:xfrm>
+          <a:prstGeom prst="rect">
+            <a:avLst/>
+          </a:prstGeom>
+        </p:spPr>
+        <p:txBody>
+          <a:bodyPr vert="horz" lIns="91440" tIns="45720" rIns="91440" bIns="45720" rtlCol="0" anchor="b"/>
+          <a:lstStyle>
+            <a:lvl1pPr algn="r">
+              <a:defRPr sz="1200"/>
+            </a:lvl1pPr>
+          </a:lstStyle>
+          <a:p>
+            <a:fld id="{367F6EA3-5658-486C-B608-A473E71362FC}" type="slidenum">
+              <a:rPr lang="en-IN" smtClean="0"/>
+              <a:t>‹#›</a:t>
+            </a:fld>
+            <a:endParaRPr lang="en-IN"/>
+          </a:p>
+        </p:txBody>
+      </p:sp>
+    </p:spTree>
+    <p:extLst>
+      <p:ext uri="{BB962C8B-B14F-4D97-AF65-F5344CB8AC3E}">
+        <p14:creationId xmlns:p14="http://schemas.microsoft.com/office/powerpoint/2010/main" val="3087615742"/>
+      </p:ext>
+    </p:extLst>
+  </p:cSld>
+  <p:clrMap bg1="lt1" tx1="dk1" bg2="lt2" tx2="dk2" accent1="accent1" accent2="accent2" accent3="accent3" accent4="accent4" accent5="accent5" accent6="accent6" hlink="hlink" folHlink="folHlink"/>
+  <p:notesStyle>
+    <a:lvl1pPr marL="0" algn="l" defTabSz="914400" rtl="0" eaLnBrk="1" latinLnBrk="0" hangingPunct="1">
+      <a:defRPr sz="1200" kern="1200">
+        <a:solidFill>
+          <a:schemeClr val="tx1"/>
+        </a:solidFill>
+        <a:latin typeface="+mn-lt"/>
+        <a:ea typeface="+mn-ea"/>
+        <a:cs typeface="+mn-cs"/>
+      </a:defRPr>
+    </a:lvl1pPr>
+    <a:lvl2pPr marL="457200" algn="l" defTabSz="914400" rtl="0" eaLnBrk="1" latinLnBrk="0" hangingPunct="1">
+      <a:defRPr sz="1200" kern="1200">
+        <a:solidFill>
+          <a:schemeClr val="tx1"/>
+        </a:solidFill>
+        <a:latin typeface="+mn-lt"/>
+        <a:ea typeface="+mn-ea"/>
+        <a:cs typeface="+mn-cs"/>
+      </a:defRPr>
+    </a:lvl2pPr>
+    <a:lvl3pPr marL="914400" algn="l" defTabSz="914400" rtl="0" eaLnBrk="1" latinLnBrk="0" hangingPunct="1">
+      <a:defRPr sz="1200" kern="1200">
+        <a:solidFill>
+          <a:schemeClr val="tx1"/>
+        </a:solidFill>
+        <a:latin typeface="+mn-lt"/>
+        <a:ea typeface="+mn-ea"/>
+        <a:cs typeface="+mn-cs"/>
+      </a:defRPr>
+    </a:lvl3pPr>
+    <a:lvl4pPr marL="1371600" algn="l" defTabSz="914400" rtl="0" eaLnBrk="1" latinLnBrk="0" hangingPunct="1">
+      <a:defRPr sz="1200" kern="1200">
+        <a:solidFill>
+          <a:schemeClr val="tx1"/>
+        </a:solidFill>
+        <a:latin typeface="+mn-lt"/>
+        <a:ea typeface="+mn-ea"/>
+        <a:cs typeface="+mn-cs"/>
+      </a:defRPr>
+    </a:lvl4pPr>
+    <a:lvl5pPr marL="1828800" algn="l" defTabSz="914400" rtl="0" eaLnBrk="1" latinLnBrk="0" hangingPunct="1">
+      <a:defRPr sz="1200" kern="1200">
+        <a:solidFill>
+          <a:schemeClr val="tx1"/>
+        </a:solidFill>
+        <a:latin typeface="+mn-lt"/>
+        <a:ea typeface="+mn-ea"/>
+        <a:cs typeface="+mn-cs"/>
+      </a:defRPr>
+    </a:lvl5pPr>
+    <a:lvl6pPr marL="2286000" algn="l" defTabSz="914400" rtl="0" eaLnBrk="1" latinLnBrk="0" hangingPunct="1">
+      <a:defRPr sz="1200" kern="1200">
+        <a:solidFill>
+          <a:schemeClr val="tx1"/>
+        </a:solidFill>
+        <a:latin typeface="+mn-lt"/>
+        <a:ea typeface="+mn-ea"/>
+        <a:cs typeface="+mn-cs"/>
+      </a:defRPr>
+    </a:lvl6pPr>
+    <a:lvl7pPr marL="2743200" algn="l" defTabSz="914400" rtl="0" eaLnBrk="1" latinLnBrk="0" hangingPunct="1">
+      <a:defRPr sz="1200" kern="1200">
+        <a:solidFill>
+          <a:schemeClr val="tx1"/>
+        </a:solidFill>
+        <a:latin typeface="+mn-lt"/>
+        <a:ea typeface="+mn-ea"/>
+        <a:cs typeface="+mn-cs"/>
+      </a:defRPr>
+    </a:lvl7pPr>
+    <a:lvl8pPr marL="3200400" algn="l" defTabSz="914400" rtl="0" eaLnBrk="1" latinLnBrk="0" hangingPunct="1">
+      <a:defRPr sz="1200" kern="1200">
+        <a:solidFill>
+          <a:schemeClr val="tx1"/>
+        </a:solidFill>
+        <a:latin typeface="+mn-lt"/>
+        <a:ea typeface="+mn-ea"/>
+        <a:cs typeface="+mn-cs"/>
+      </a:defRPr>
+    </a:lvl8pPr>
+    <a:lvl9pPr marL="3657600" algn="l" defTabSz="914400" rtl="0" eaLnBrk="1" latinLnBrk="0" hangingPunct="1">
+      <a:defRPr sz="1200" kern="1200">
+        <a:solidFill>
+          <a:schemeClr val="tx1"/>
+        </a:solidFill>
+        <a:latin typeface="+mn-lt"/>
+        <a:ea typeface="+mn-ea"/>
+        <a:cs typeface="+mn-cs"/>
+      </a:defRPr>
+    </a:lvl9pPr>
+  </p:notesStyle>
+</p:notesMaster>
+</file>
+
 <file path=ppt/slideLayouts/slideLayout1.xml><?xml version="1.0" encoding="utf-8"?>
 <p:sldLayout xmlns:a="http://schemas.openxmlformats.org/drawingml/2006/main" xmlns:r="http://schemas.openxmlformats.org/officeDocument/2006/relationships" xmlns:p="http://schemas.openxmlformats.org/presentationml/2006/main" showMasterSp="0" type="title" preserve="1">
   <p:cSld name="Title Slide">
@@ -341,7 +697,7 @@
           <a:bodyPr/>
           <a:lstStyle/>
           <a:p>
-            <a:fld id="{BDC29EA4-F48E-44C4-A859-8FF7E6C09897}" type="datetimeFigureOut">
+            <a:fld id="{77EBDCBC-06F4-4703-B1B7-5A8BDE4BA5CB}" type="datetime1">
               <a:rPr lang="en-IN" smtClean="0"/>
               <a:t>12-04-2023</a:t>
             </a:fld>
@@ -549,7 +905,7 @@
           <a:bodyPr/>
           <a:lstStyle/>
           <a:p>
-            <a:fld id="{BDC29EA4-F48E-44C4-A859-8FF7E6C09897}" type="datetimeFigureOut">
+            <a:fld id="{041798B1-B1A7-48AC-ABEA-7529C136A911}" type="datetime1">
               <a:rPr lang="en-IN" smtClean="0"/>
               <a:t>12-04-2023</a:t>
             </a:fld>
@@ -805,7 +1161,7 @@
           <a:bodyPr/>
           <a:lstStyle/>
           <a:p>
-            <a:fld id="{BDC29EA4-F48E-44C4-A859-8FF7E6C09897}" type="datetimeFigureOut">
+            <a:fld id="{BD3C7D88-3F59-45FE-9FB4-E57F32CC4186}" type="datetime1">
               <a:rPr lang="en-IN" smtClean="0"/>
               <a:t>12-04-2023</a:t>
             </a:fld>
@@ -979,7 +1335,7 @@
           <a:bodyPr/>
           <a:lstStyle/>
           <a:p>
-            <a:fld id="{BDC29EA4-F48E-44C4-A859-8FF7E6C09897}" type="datetimeFigureOut">
+            <a:fld id="{A1F91587-4A06-4220-96C1-2B1ED61B7D23}" type="datetime1">
               <a:rPr lang="en-IN" smtClean="0"/>
               <a:t>12-04-2023</a:t>
             </a:fld>
@@ -1322,7 +1678,7 @@
           <a:bodyPr/>
           <a:lstStyle/>
           <a:p>
-            <a:fld id="{BDC29EA4-F48E-44C4-A859-8FF7E6C09897}" type="datetimeFigureOut">
+            <a:fld id="{52E225CB-0C3D-40BD-A0C5-3EB327BA7811}" type="datetime1">
               <a:rPr lang="en-IN" smtClean="0"/>
               <a:t>12-04-2023</a:t>
             </a:fld>
@@ -1359,7 +1715,12 @@
             <p:ph type="sldNum" sz="quarter" idx="12"/>
           </p:nvPr>
         </p:nvSpPr>
-        <p:spPr/>
+        <p:spPr>
+          <a:xfrm>
+            <a:off x="10789458" y="6442570"/>
+            <a:ext cx="1312025" cy="365125"/>
+          </a:xfrm>
+        </p:spPr>
         <p:txBody>
           <a:bodyPr/>
           <a:lstStyle/>
@@ -1368,7 +1729,7 @@
               <a:rPr lang="en-IN" smtClean="0"/>
               <a:t>‹#›</a:t>
             </a:fld>
-            <a:endParaRPr lang="en-IN"/>
+            <a:endParaRPr lang="en-IN" dirty="0"/>
           </a:p>
         </p:txBody>
       </p:sp>
@@ -1597,7 +1958,7 @@
           <a:bodyPr/>
           <a:lstStyle/>
           <a:p>
-            <a:fld id="{BDC29EA4-F48E-44C4-A859-8FF7E6C09897}" type="datetimeFigureOut">
+            <a:fld id="{E697D3D1-6163-4571-9E69-19B3E47D9AFF}" type="datetime1">
               <a:rPr lang="en-IN" smtClean="0"/>
               <a:t>12-04-2023</a:t>
             </a:fld>
@@ -1976,7 +2337,7 @@
           <a:bodyPr/>
           <a:lstStyle/>
           <a:p>
-            <a:fld id="{BDC29EA4-F48E-44C4-A859-8FF7E6C09897}" type="datetimeFigureOut">
+            <a:fld id="{F47E3024-B6E0-4968-9C14-073EDF939C18}" type="datetime1">
               <a:rPr lang="en-IN" smtClean="0"/>
               <a:t>12-04-2023</a:t>
             </a:fld>
@@ -2094,7 +2455,7 @@
           <a:bodyPr/>
           <a:lstStyle/>
           <a:p>
-            <a:fld id="{BDC29EA4-F48E-44C4-A859-8FF7E6C09897}" type="datetimeFigureOut">
+            <a:fld id="{BD33D5C1-4165-42C3-918B-D31EFA86D471}" type="datetime1">
               <a:rPr lang="en-IN" smtClean="0"/>
               <a:t>12-04-2023</a:t>
             </a:fld>
@@ -2265,7 +2626,7 @@
           <a:bodyPr/>
           <a:lstStyle/>
           <a:p>
-            <a:fld id="{BDC29EA4-F48E-44C4-A859-8FF7E6C09897}" type="datetimeFigureOut">
+            <a:fld id="{C83255F2-76D7-447B-A555-6B8DB1E1254E}" type="datetime1">
               <a:rPr lang="en-IN" smtClean="0"/>
               <a:t>12-04-2023</a:t>
             </a:fld>
@@ -2619,7 +2980,7 @@
             </a:lvl1pPr>
           </a:lstStyle>
           <a:p>
-            <a:fld id="{BDC29EA4-F48E-44C4-A859-8FF7E6C09897}" type="datetimeFigureOut">
+            <a:fld id="{5C14EAE0-739F-450F-A532-FF8EF62C5640}" type="datetime1">
               <a:rPr lang="en-IN" smtClean="0"/>
               <a:t>12-04-2023</a:t>
             </a:fld>
@@ -3001,7 +3362,7 @@
           <a:bodyPr/>
           <a:lstStyle/>
           <a:p>
-            <a:fld id="{BDC29EA4-F48E-44C4-A859-8FF7E6C09897}" type="datetimeFigureOut">
+            <a:fld id="{B1CCC27C-E4FC-4E80-93FB-DA3DADCEB481}" type="datetime1">
               <a:rPr lang="en-IN" smtClean="0"/>
               <a:t>12-04-2023</a:t>
             </a:fld>
@@ -3188,7 +3549,7 @@
           <a:lstStyle/>
           <a:p>
             <a:r>
-              <a:rPr lang="en-US" smtClean="0"/>
+              <a:rPr lang="en-US" dirty="0" smtClean="0"/>
               <a:t>Click to edit Master title style</a:t>
             </a:r>
             <a:endParaRPr lang="en-US" dirty="0"/>
@@ -3288,7 +3649,7 @@
             </a:lvl1pPr>
           </a:lstStyle>
           <a:p>
-            <a:fld id="{BDC29EA4-F48E-44C4-A859-8FF7E6C09897}" type="datetimeFigureOut">
+            <a:fld id="{C8D9EBF7-55E0-4F5B-BF4C-1C8A7E54CBE2}" type="datetime1">
               <a:rPr lang="en-IN" smtClean="0"/>
               <a:t>12-04-2023</a:t>
             </a:fld>
@@ -3343,7 +3704,7 @@
         </p:nvSpPr>
         <p:spPr>
           <a:xfrm>
-            <a:off x="9900458" y="6459785"/>
+            <a:off x="10747125" y="6442570"/>
             <a:ext cx="1312025" cy="365125"/>
           </a:xfrm>
           <a:prstGeom prst="rect">
@@ -3366,7 +3727,7 @@
               <a:rPr lang="en-IN" smtClean="0"/>
               <a:t>‹#›</a:t>
             </a:fld>
-            <a:endParaRPr lang="en-IN"/>
+            <a:endParaRPr lang="en-IN" dirty="0"/>
           </a:p>
         </p:txBody>
       </p:sp>
@@ -3429,6 +3790,7 @@
     <p:sldLayoutId id="2147483670" r:id="rId10"/>
     <p:sldLayoutId id="2147483671" r:id="rId11"/>
   </p:sldLayoutIdLst>
+  <p:hf hdr="0" ftr="0" dt="0"/>
   <p:txStyles>
     <p:titleStyle>
       <a:lvl1pPr algn="l" defTabSz="914400" rtl="0" eaLnBrk="1" latinLnBrk="0" hangingPunct="1">
@@ -3441,10 +3803,7 @@
         <a:buNone/>
         <a:defRPr sz="4800" kern="1200" spc="-50" baseline="0">
           <a:solidFill>
-            <a:schemeClr val="tx1">
-              <a:lumMod val="75000"/>
-              <a:lumOff val="25000"/>
-            </a:schemeClr>
+            <a:schemeClr val="accent1"/>
           </a:solidFill>
           <a:latin typeface="+mj-lt"/>
           <a:ea typeface="+mj-ea"/>
@@ -3832,10 +4191,18 @@
           <a:lstStyle/>
           <a:p>
             <a:r>
-              <a:rPr lang="en-US" sz="6600" dirty="0" smtClean="0"/>
+              <a:rPr lang="en-US" sz="6600" dirty="0" smtClean="0">
+                <a:solidFill>
+                  <a:schemeClr val="accent2"/>
+                </a:solidFill>
+              </a:rPr>
               <a:t>Dynamic Operating Envelopes</a:t>
             </a:r>
-            <a:endParaRPr lang="en-IN" sz="6600" dirty="0"/>
+            <a:endParaRPr lang="en-IN" sz="6600" dirty="0">
+              <a:solidFill>
+                <a:schemeClr val="accent2"/>
+              </a:solidFill>
+            </a:endParaRPr>
           </a:p>
         </p:txBody>
       </p:sp>
@@ -3857,16 +4224,51 @@
           <a:lstStyle/>
           <a:p>
             <a:r>
-              <a:rPr lang="en-US" dirty="0" smtClean="0"/>
+              <a:rPr lang="en-US" dirty="0" smtClean="0">
+                <a:solidFill>
+                  <a:schemeClr val="accent1"/>
+                </a:solidFill>
+              </a:rPr>
               <a:t>Athul Jose P</a:t>
             </a:r>
           </a:p>
           <a:p>
             <a:r>
-              <a:rPr lang="en-US" dirty="0" smtClean="0"/>
+              <a:rPr lang="en-US" dirty="0" smtClean="0">
+                <a:solidFill>
+                  <a:schemeClr val="accent1"/>
+                </a:solidFill>
+              </a:rPr>
               <a:t>11867566</a:t>
             </a:r>
-            <a:endParaRPr lang="en-IN" dirty="0"/>
+            <a:endParaRPr lang="en-IN" dirty="0">
+              <a:solidFill>
+                <a:schemeClr val="accent1"/>
+              </a:solidFill>
+            </a:endParaRPr>
+          </a:p>
+        </p:txBody>
+      </p:sp>
+      <p:sp>
+        <p:nvSpPr>
+          <p:cNvPr id="4" name="Slide Number Placeholder 3"/>
+          <p:cNvSpPr>
+            <a:spLocks noGrp="1"/>
+          </p:cNvSpPr>
+          <p:nvPr>
+            <p:ph type="sldNum" sz="quarter" idx="12"/>
+          </p:nvPr>
+        </p:nvSpPr>
+        <p:spPr/>
+        <p:txBody>
+          <a:bodyPr/>
+          <a:lstStyle/>
+          <a:p>
+            <a:fld id="{806BD4E3-0125-423E-A2AC-3792473F6B73}" type="slidenum">
+              <a:rPr lang="en-IN" smtClean="0"/>
+              <a:t>1</a:t>
+            </a:fld>
+            <a:endParaRPr lang="en-IN"/>
           </a:p>
         </p:txBody>
       </p:sp>
@@ -3916,10 +4318,18 @@
           <a:lstStyle/>
           <a:p>
             <a:r>
-              <a:rPr lang="en-IN" dirty="0" smtClean="0"/>
+              <a:rPr lang="en-IN" dirty="0" smtClean="0">
+                <a:solidFill>
+                  <a:schemeClr val="accent1"/>
+                </a:solidFill>
+              </a:rPr>
               <a:t>Introduction</a:t>
             </a:r>
-            <a:endParaRPr lang="en-IN" dirty="0"/>
+            <a:endParaRPr lang="en-IN" dirty="0">
+              <a:solidFill>
+                <a:schemeClr val="accent1"/>
+              </a:solidFill>
+            </a:endParaRPr>
           </a:p>
         </p:txBody>
       </p:sp>
@@ -3954,7 +4364,7 @@
             </a:pPr>
             <a:r>
               <a:rPr lang="en-IN" dirty="0" smtClean="0"/>
-              <a:t>Potential of DERs in participating markets</a:t>
+              <a:t>Unutilized installed capacity of DERs</a:t>
             </a:r>
           </a:p>
           <a:p>
@@ -3963,8 +4373,8 @@
               <a:buChar char="•"/>
             </a:pPr>
             <a:r>
-              <a:rPr lang="en-IN" dirty="0" smtClean="0"/>
-              <a:t>Load aggregator bundles large number of DERs to participate in wholesale energy market</a:t>
+              <a:rPr lang="en-IN" dirty="0"/>
+              <a:t>Potential of DERs in participating markets</a:t>
             </a:r>
           </a:p>
           <a:p>
@@ -3972,36 +4382,7 @@
               <a:buFont typeface="Arial" panose="020B0604020202020204" pitchFamily="34" charset="0"/>
               <a:buChar char="•"/>
             </a:pPr>
-            <a:r>
-              <a:rPr lang="en-IN" dirty="0" smtClean="0"/>
-              <a:t>Need of scheduling energy and calculating optimal flexibility – Optimal Flexibility Design (OFD)</a:t>
-            </a:r>
-          </a:p>
-          <a:p>
-            <a:pPr marL="635508" lvl="1" indent="-342900">
-              <a:buFont typeface="+mj-lt"/>
-              <a:buAutoNum type="arabicPeriod"/>
-            </a:pPr>
-            <a:r>
-              <a:rPr lang="en-IN" dirty="0" smtClean="0"/>
-              <a:t>Geometric Techniques - </a:t>
-            </a:r>
-            <a:r>
-              <a:rPr lang="en-IN" dirty="0" err="1" smtClean="0"/>
-              <a:t>polytope</a:t>
-            </a:r>
             <a:endParaRPr lang="en-IN" dirty="0" smtClean="0"/>
-          </a:p>
-          <a:p>
-            <a:pPr marL="635508" lvl="1" indent="-342900">
-              <a:buFont typeface="+mj-lt"/>
-              <a:buAutoNum type="arabicPeriod"/>
-            </a:pPr>
-            <a:r>
-              <a:rPr lang="en-IN" dirty="0" smtClean="0"/>
-              <a:t>Multilevel Optimization Problem - ellipsoid</a:t>
-            </a:r>
-            <a:endParaRPr lang="en-IN" dirty="0"/>
           </a:p>
           <a:p>
             <a:pPr marL="180975" indent="-180975">
@@ -4009,6 +4390,29 @@
               <a:buChar char="•"/>
             </a:pPr>
             <a:endParaRPr lang="en-IN" dirty="0"/>
+          </a:p>
+        </p:txBody>
+      </p:sp>
+      <p:sp>
+        <p:nvSpPr>
+          <p:cNvPr id="4" name="Slide Number Placeholder 3"/>
+          <p:cNvSpPr>
+            <a:spLocks noGrp="1"/>
+          </p:cNvSpPr>
+          <p:nvPr>
+            <p:ph type="sldNum" sz="quarter" idx="12"/>
+          </p:nvPr>
+        </p:nvSpPr>
+        <p:spPr/>
+        <p:txBody>
+          <a:bodyPr/>
+          <a:lstStyle/>
+          <a:p>
+            <a:fld id="{806BD4E3-0125-423E-A2AC-3792473F6B73}" type="slidenum">
+              <a:rPr lang="en-IN" smtClean="0"/>
+              <a:t>2</a:t>
+            </a:fld>
+            <a:endParaRPr lang="en-IN"/>
           </a:p>
         </p:txBody>
       </p:sp>
@@ -4058,10 +4462,18 @@
           <a:lstStyle/>
           <a:p>
             <a:r>
-              <a:rPr lang="en-IN" dirty="0" smtClean="0"/>
+              <a:rPr lang="en-IN" dirty="0" smtClean="0">
+                <a:solidFill>
+                  <a:schemeClr val="accent1"/>
+                </a:solidFill>
+              </a:rPr>
               <a:t>Dynamic Operating Envelope</a:t>
             </a:r>
-            <a:endParaRPr lang="en-IN" dirty="0"/>
+            <a:endParaRPr lang="en-IN" dirty="0">
+              <a:solidFill>
+                <a:schemeClr val="accent1"/>
+              </a:solidFill>
+            </a:endParaRPr>
           </a:p>
         </p:txBody>
       </p:sp>
@@ -4106,10 +4518,162 @@
               <a:buChar char="•"/>
             </a:pPr>
             <a:r>
+              <a:rPr lang="en-US" dirty="0"/>
+              <a:t>DOEs could be used to manage ’flexible loads’ such as water heaters, battery storage and electric vehicles (EVs)</a:t>
+            </a:r>
+            <a:endParaRPr lang="en-IN" dirty="0"/>
+          </a:p>
+          <a:p>
+            <a:pPr marL="0" indent="0">
+              <a:buNone/>
+            </a:pPr>
+            <a:r>
+              <a:rPr lang="en-US" sz="2400" dirty="0" smtClean="0">
+                <a:solidFill>
+                  <a:schemeClr val="accent1"/>
+                </a:solidFill>
+              </a:rPr>
+              <a:t>Benefits</a:t>
+            </a:r>
+          </a:p>
+          <a:p>
+            <a:pPr marL="0" indent="0">
+              <a:buNone/>
+            </a:pPr>
+            <a:r>
               <a:rPr lang="en-US" dirty="0" smtClean="0"/>
-              <a:t>DOE enables higher levels of energy exports from customers’ solar and battery systems by allowing higher export limits when there is more hosting capacity on the local network</a:t>
-            </a:r>
-            <a:endParaRPr lang="en-IN" dirty="0" smtClean="0"/>
+              <a:t>	1. More </a:t>
+            </a:r>
+            <a:r>
+              <a:rPr lang="en-US" dirty="0"/>
+              <a:t>solar / battery </a:t>
+            </a:r>
+            <a:r>
+              <a:rPr lang="en-US" dirty="0" smtClean="0"/>
+              <a:t>support</a:t>
+            </a:r>
+            <a:br>
+              <a:rPr lang="en-US" dirty="0" smtClean="0"/>
+            </a:br>
+            <a:r>
+              <a:rPr lang="en-US" dirty="0" smtClean="0"/>
+              <a:t>	2. Market </a:t>
+            </a:r>
+            <a:r>
+              <a:rPr lang="en-US" dirty="0"/>
+              <a:t>Efficiency</a:t>
+            </a:r>
+            <a:br>
+              <a:rPr lang="en-US" dirty="0"/>
+            </a:br>
+            <a:r>
+              <a:rPr lang="en-US" dirty="0" smtClean="0"/>
+              <a:t>	3</a:t>
+            </a:r>
+            <a:r>
+              <a:rPr lang="en-US" dirty="0"/>
+              <a:t>. Greater Interoperability</a:t>
+            </a:r>
+            <a:br>
+              <a:rPr lang="en-US" dirty="0"/>
+            </a:br>
+            <a:r>
+              <a:rPr lang="en-US" dirty="0" smtClean="0"/>
+              <a:t>	4</a:t>
+            </a:r>
+            <a:r>
+              <a:rPr lang="en-US" dirty="0"/>
+              <a:t>. Network </a:t>
+            </a:r>
+            <a:r>
+              <a:rPr lang="en-US" dirty="0" smtClean="0"/>
+              <a:t>Efficiency</a:t>
+            </a:r>
+          </a:p>
+        </p:txBody>
+      </p:sp>
+      <p:sp>
+        <p:nvSpPr>
+          <p:cNvPr id="4" name="Slide Number Placeholder 3"/>
+          <p:cNvSpPr>
+            <a:spLocks noGrp="1"/>
+          </p:cNvSpPr>
+          <p:nvPr>
+            <p:ph type="sldNum" sz="quarter" idx="12"/>
+          </p:nvPr>
+        </p:nvSpPr>
+        <p:spPr/>
+        <p:txBody>
+          <a:bodyPr/>
+          <a:lstStyle/>
+          <a:p>
+            <a:fld id="{806BD4E3-0125-423E-A2AC-3792473F6B73}" type="slidenum">
+              <a:rPr lang="en-IN" smtClean="0"/>
+              <a:t>3</a:t>
+            </a:fld>
+            <a:endParaRPr lang="en-IN"/>
+          </a:p>
+        </p:txBody>
+      </p:sp>
+      <p:sp>
+        <p:nvSpPr>
+          <p:cNvPr id="5" name="TextBox 4"/>
+          <p:cNvSpPr txBox="1"/>
+          <p:nvPr/>
+        </p:nvSpPr>
+        <p:spPr>
+          <a:xfrm>
+            <a:off x="273415" y="6414520"/>
+            <a:ext cx="11170166" cy="253916"/>
+          </a:xfrm>
+          <a:prstGeom prst="rect">
+            <a:avLst/>
+          </a:prstGeom>
+          <a:noFill/>
+        </p:spPr>
+        <p:txBody>
+          <a:bodyPr wrap="square" rtlCol="0">
+            <a:spAutoFit/>
+          </a:bodyPr>
+          <a:lstStyle/>
+          <a:p>
+            <a:r>
+              <a:rPr lang="en-US" sz="1050" dirty="0" smtClean="0">
+                <a:solidFill>
+                  <a:schemeClr val="bg1"/>
+                </a:solidFill>
+              </a:rPr>
+              <a:t>DEIP</a:t>
+            </a:r>
+            <a:r>
+              <a:rPr lang="en-US" sz="1050" dirty="0">
+                <a:solidFill>
+                  <a:schemeClr val="bg1"/>
+                </a:solidFill>
+              </a:rPr>
+              <a:t>, “Dynamic </a:t>
+            </a:r>
+            <a:r>
+              <a:rPr lang="en-US" sz="1050" dirty="0" err="1">
+                <a:solidFill>
+                  <a:schemeClr val="bg1"/>
+                </a:solidFill>
+              </a:rPr>
+              <a:t>operting</a:t>
+            </a:r>
+            <a:r>
+              <a:rPr lang="en-US" sz="1050" dirty="0">
+                <a:solidFill>
+                  <a:schemeClr val="bg1"/>
+                </a:solidFill>
+              </a:rPr>
+              <a:t> envelopes working group outcomes report,” DEIP, Tech. Rep., 2022.</a:t>
+            </a:r>
+            <a:endParaRPr lang="en-IN" sz="1050" dirty="0">
+              <a:solidFill>
+                <a:schemeClr val="bg1"/>
+              </a:solidFill>
+            </a:endParaRPr>
           </a:p>
         </p:txBody>
       </p:sp>
@@ -4159,21 +4723,64 @@
           <a:lstStyle/>
           <a:p>
             <a:r>
-              <a:rPr lang="en-IN" dirty="0" smtClean="0"/>
-              <a:t>Dynamic Operating Envelope</a:t>
-            </a:r>
-            <a:endParaRPr lang="en-IN" dirty="0"/>
-          </a:p>
-        </p:txBody>
-      </p:sp>
-      <p:sp>
-        <p:nvSpPr>
-          <p:cNvPr id="3" name="Content Placeholder 2"/>
-          <p:cNvSpPr>
-            <a:spLocks noGrp="1"/>
-          </p:cNvSpPr>
-          <p:nvPr>
-            <p:ph idx="1"/>
+              <a:rPr lang="en-IN" dirty="0" smtClean="0">
+                <a:solidFill>
+                  <a:schemeClr val="accent1"/>
+                </a:solidFill>
+              </a:rPr>
+              <a:t>Calculating Operating Envelope</a:t>
+            </a:r>
+            <a:endParaRPr lang="en-IN" dirty="0">
+              <a:solidFill>
+                <a:schemeClr val="accent1"/>
+              </a:solidFill>
+            </a:endParaRPr>
+          </a:p>
+        </p:txBody>
+      </p:sp>
+      <p:pic>
+        <p:nvPicPr>
+          <p:cNvPr id="4" name="Picture 3"/>
+          <p:cNvPicPr>
+            <a:picLocks noChangeAspect="1"/>
+          </p:cNvPicPr>
+          <p:nvPr/>
+        </p:nvPicPr>
+        <p:blipFill>
+          <a:blip r:embed="rId2">
+            <a:clrChange>
+              <a:clrFrom>
+                <a:srgbClr val="E4DDE7"/>
+              </a:clrFrom>
+              <a:clrTo>
+                <a:srgbClr val="E4DDE7">
+                  <a:alpha val="0"/>
+                </a:srgbClr>
+              </a:clrTo>
+            </a:clrChange>
+          </a:blip>
+          <a:stretch>
+            <a:fillRect/>
+          </a:stretch>
+        </p:blipFill>
+        <p:spPr>
+          <a:xfrm>
+            <a:off x="2171152" y="2119129"/>
+            <a:ext cx="7849695" cy="2619741"/>
+          </a:xfrm>
+          <a:prstGeom prst="rect">
+            <a:avLst/>
+          </a:prstGeom>
+        </p:spPr>
+      </p:pic>
+      <p:sp>
+        <p:nvSpPr>
+          <p:cNvPr id="3" name="Slide Number Placeholder 2"/>
+          <p:cNvSpPr>
+            <a:spLocks noGrp="1"/>
+          </p:cNvSpPr>
+          <p:nvPr>
+            <p:ph type="sldNum" sz="quarter" idx="12"/>
           </p:nvPr>
         </p:nvSpPr>
         <p:spPr/>
@@ -4181,81 +4788,136 @@
           <a:bodyPr/>
           <a:lstStyle/>
           <a:p>
-            <a:pPr marL="180975" indent="-180975">
-              <a:buFont typeface="Arial" panose="020B0604020202020204" pitchFamily="34" charset="0"/>
-              <a:buChar char="•"/>
-            </a:pPr>
-            <a:r>
-              <a:rPr lang="en-IN" dirty="0" smtClean="0"/>
-              <a:t>Aggregators comprises of large no of active consumers participating in energy market and ancillary service market</a:t>
-            </a:r>
-          </a:p>
-          <a:p>
-            <a:pPr marL="180975" indent="-180975">
-              <a:buFont typeface="Arial" panose="020B0604020202020204" pitchFamily="34" charset="0"/>
-              <a:buChar char="•"/>
-            </a:pPr>
-            <a:r>
-              <a:rPr lang="en-IN" dirty="0" smtClean="0"/>
-              <a:t>Aggregated response at system level</a:t>
-            </a:r>
-          </a:p>
-          <a:p>
-            <a:pPr marL="180975" indent="-180975">
-              <a:buFont typeface="Arial" panose="020B0604020202020204" pitchFamily="34" charset="0"/>
-              <a:buChar char="•"/>
-            </a:pPr>
-            <a:r>
-              <a:rPr lang="en-IN" dirty="0" smtClean="0"/>
-              <a:t>Operating Envelope: Time varying export or import levels</a:t>
-            </a:r>
-          </a:p>
-          <a:p>
-            <a:pPr marL="180975" indent="-180975">
-              <a:buFont typeface="Arial" panose="020B0604020202020204" pitchFamily="34" charset="0"/>
-              <a:buChar char="•"/>
-            </a:pPr>
-            <a:r>
-              <a:rPr lang="en-IN" dirty="0" smtClean="0"/>
-              <a:t>Roles</a:t>
-            </a:r>
-          </a:p>
-          <a:p>
-            <a:pPr marL="544068" lvl="1" indent="-342900">
-              <a:buFont typeface="+mj-lt"/>
-              <a:buAutoNum type="arabicPeriod"/>
-            </a:pPr>
-            <a:r>
-              <a:rPr lang="en-IN" dirty="0" smtClean="0"/>
-              <a:t>Distribution System Operator</a:t>
-            </a:r>
-          </a:p>
-          <a:p>
-            <a:pPr marL="544068" lvl="1" indent="-342900">
-              <a:buFont typeface="+mj-lt"/>
-              <a:buAutoNum type="arabicPeriod"/>
-            </a:pPr>
-            <a:r>
-              <a:rPr lang="en-IN" dirty="0" smtClean="0"/>
-              <a:t>Distribution Market Operator</a:t>
-            </a:r>
-          </a:p>
-          <a:p>
-            <a:pPr marL="544068" lvl="1" indent="-342900">
-              <a:buFont typeface="+mj-lt"/>
-              <a:buAutoNum type="arabicPeriod"/>
-            </a:pPr>
-            <a:r>
-              <a:rPr lang="en-IN" dirty="0" smtClean="0"/>
-              <a:t>The aggregator</a:t>
-            </a:r>
+            <a:fld id="{806BD4E3-0125-423E-A2AC-3792473F6B73}" type="slidenum">
+              <a:rPr lang="en-IN" smtClean="0"/>
+              <a:t>4</a:t>
+            </a:fld>
+            <a:endParaRPr lang="en-IN"/>
+          </a:p>
+        </p:txBody>
+      </p:sp>
+      <p:sp>
+        <p:nvSpPr>
+          <p:cNvPr id="5" name="TextBox 4"/>
+          <p:cNvSpPr txBox="1"/>
+          <p:nvPr/>
+        </p:nvSpPr>
+        <p:spPr>
+          <a:xfrm>
+            <a:off x="273415" y="6414520"/>
+            <a:ext cx="11170166" cy="415498"/>
+          </a:xfrm>
+          <a:prstGeom prst="rect">
+            <a:avLst/>
+          </a:prstGeom>
+          <a:noFill/>
+        </p:spPr>
+        <p:txBody>
+          <a:bodyPr wrap="square" rtlCol="0">
+            <a:spAutoFit/>
+          </a:bodyPr>
+          <a:lstStyle/>
+          <a:p>
+            <a:r>
+              <a:rPr lang="en-IN" sz="1050" dirty="0">
+                <a:solidFill>
+                  <a:schemeClr val="bg1"/>
+                </a:solidFill>
+              </a:rPr>
+              <a:t>M. Z. Liu, L. N. Ochoa, S. </a:t>
+            </a:r>
+            <a:r>
+              <a:rPr lang="en-IN" sz="1050" dirty="0" err="1">
+                <a:solidFill>
+                  <a:schemeClr val="bg1"/>
+                </a:solidFill>
+              </a:rPr>
+              <a:t>Riaz</a:t>
+            </a:r>
+            <a:r>
+              <a:rPr lang="en-IN" sz="1050" dirty="0">
+                <a:solidFill>
+                  <a:schemeClr val="bg1"/>
+                </a:solidFill>
+              </a:rPr>
+              <a:t>, P. </a:t>
+            </a:r>
+            <a:r>
+              <a:rPr lang="en-IN" sz="1050" dirty="0" err="1">
+                <a:solidFill>
+                  <a:schemeClr val="bg1"/>
+                </a:solidFill>
+              </a:rPr>
+              <a:t>Mancarella</a:t>
+            </a:r>
+            <a:r>
+              <a:rPr lang="en-IN" sz="1050" dirty="0">
+                <a:solidFill>
+                  <a:schemeClr val="bg1"/>
+                </a:solidFill>
+              </a:rPr>
+              <a:t>, T. Ting, J. San, and J. </a:t>
+            </a:r>
+            <a:r>
+              <a:rPr lang="en-IN" sz="1050" dirty="0" err="1">
+                <a:solidFill>
+                  <a:schemeClr val="bg1"/>
+                </a:solidFill>
+              </a:rPr>
+              <a:t>Theunissen</a:t>
+            </a:r>
+            <a:r>
+              <a:rPr lang="en-IN" sz="1050" dirty="0">
+                <a:solidFill>
+                  <a:schemeClr val="bg1"/>
+                </a:solidFill>
+              </a:rPr>
+              <a:t>, “Grid </a:t>
+            </a:r>
+            <a:r>
+              <a:rPr lang="en-IN" sz="1050" dirty="0" smtClean="0">
+                <a:solidFill>
+                  <a:schemeClr val="bg1"/>
+                </a:solidFill>
+              </a:rPr>
+              <a:t>and market </a:t>
+            </a:r>
+            <a:r>
+              <a:rPr lang="en-IN" sz="1050" dirty="0">
+                <a:solidFill>
+                  <a:schemeClr val="bg1"/>
+                </a:solidFill>
+              </a:rPr>
+              <a:t>services from the edge: Using operating envelopes to unlock network-aware </a:t>
+            </a:r>
+            <a:r>
+              <a:rPr lang="en-IN" sz="1050" dirty="0" smtClean="0">
+                <a:solidFill>
+                  <a:schemeClr val="bg1"/>
+                </a:solidFill>
+              </a:rPr>
+              <a:t>bottom-up flexibility</a:t>
+            </a:r>
+            <a:r>
+              <a:rPr lang="en-IN" sz="1050" dirty="0">
+                <a:solidFill>
+                  <a:schemeClr val="bg1"/>
+                </a:solidFill>
+              </a:rPr>
+              <a:t>,” IEEE Power and Energy Magazine, vol. 19, no. 4, pp. 52–62, 2021.</a:t>
+            </a:r>
+            <a:endParaRPr lang="en-IN" sz="1050" dirty="0">
+              <a:solidFill>
+                <a:schemeClr val="bg1"/>
+              </a:solidFill>
+            </a:endParaRPr>
           </a:p>
         </p:txBody>
       </p:sp>
     </p:spTree>
     <p:extLst>
       <p:ext uri="{BB962C8B-B14F-4D97-AF65-F5344CB8AC3E}">
-        <p14:creationId xmlns:p14="http://schemas.microsoft.com/office/powerpoint/2010/main" val="2335457347"/>
+        <p14:creationId xmlns:p14="http://schemas.microsoft.com/office/powerpoint/2010/main" val="3175966176"/>
       </p:ext>
     </p:extLst>
   </p:cSld>
@@ -4284,12 +4946,12 @@
       </p:grpSpPr>
       <p:sp>
         <p:nvSpPr>
-          <p:cNvPr id="2" name="Title 1"/>
-          <p:cNvSpPr>
-            <a:spLocks noGrp="1"/>
-          </p:cNvSpPr>
-          <p:nvPr>
-            <p:ph type="title"/>
+          <p:cNvPr id="2" name="Slide Number Placeholder 1"/>
+          <p:cNvSpPr>
+            <a:spLocks noGrp="1"/>
+          </p:cNvSpPr>
+          <p:nvPr>
+            <p:ph type="sldNum" sz="quarter" idx="12"/>
           </p:nvPr>
         </p:nvSpPr>
         <p:spPr/>
@@ -4297,26 +4959,69 @@
           <a:bodyPr/>
           <a:lstStyle/>
           <a:p>
+            <a:fld id="{806BD4E3-0125-423E-A2AC-3792473F6B73}" type="slidenum">
+              <a:rPr lang="en-IN" smtClean="0"/>
+              <a:t>5</a:t>
+            </a:fld>
             <a:endParaRPr lang="en-IN"/>
           </a:p>
         </p:txBody>
       </p:sp>
       <p:sp>
         <p:nvSpPr>
-          <p:cNvPr id="3" name="Content Placeholder 2"/>
-          <p:cNvSpPr>
-            <a:spLocks noGrp="1"/>
-          </p:cNvSpPr>
-          <p:nvPr>
-            <p:ph idx="1"/>
-          </p:nvPr>
-        </p:nvSpPr>
-        <p:spPr/>
+          <p:cNvPr id="3" name="Title 1"/>
+          <p:cNvSpPr txBox="1">
+            <a:spLocks/>
+          </p:cNvSpPr>
+          <p:nvPr/>
+        </p:nvSpPr>
+        <p:spPr>
+          <a:xfrm>
+            <a:off x="1097280" y="286603"/>
+            <a:ext cx="10058400" cy="736439"/>
+          </a:xfrm>
+          <a:prstGeom prst="rect">
+            <a:avLst/>
+          </a:prstGeom>
+        </p:spPr>
         <p:txBody>
           <a:bodyPr/>
-          <a:lstStyle/>
-          <a:p>
-            <a:endParaRPr lang="en-IN"/>
+          <a:lstStyle>
+            <a:lvl1pPr algn="l" defTabSz="914400" rtl="0" eaLnBrk="1" latinLnBrk="0" hangingPunct="1">
+              <a:lnSpc>
+                <a:spcPct val="85000"/>
+              </a:lnSpc>
+              <a:spcBef>
+                <a:spcPct val="0"/>
+              </a:spcBef>
+              <a:buNone/>
+              <a:defRPr sz="4800" kern="1200" spc="-50" baseline="0">
+                <a:solidFill>
+                  <a:schemeClr val="tx1">
+                    <a:lumMod val="75000"/>
+                    <a:lumOff val="25000"/>
+                  </a:schemeClr>
+                </a:solidFill>
+                <a:latin typeface="+mj-lt"/>
+                <a:ea typeface="+mj-ea"/>
+                <a:cs typeface="+mj-cs"/>
+              </a:defRPr>
+            </a:lvl1pPr>
+          </a:lstStyle>
+          <a:p>
+            <a:r>
+              <a:rPr lang="en-IN" dirty="0" smtClean="0">
+                <a:solidFill>
+                  <a:schemeClr val="accent1"/>
+                </a:solidFill>
+              </a:rPr>
+              <a:t>Allocation of DOE</a:t>
+            </a:r>
+            <a:endParaRPr lang="en-IN" dirty="0">
+              <a:solidFill>
+                <a:schemeClr val="accent1"/>
+              </a:solidFill>
+            </a:endParaRPr>
           </a:p>
         </p:txBody>
       </p:sp>
@@ -4336,18 +5041,323 @@
         </p:blipFill>
         <p:spPr>
           <a:xfrm>
-            <a:off x="613597" y="4284"/>
-            <a:ext cx="10964805" cy="6849431"/>
+            <a:off x="6404610" y="1023042"/>
+            <a:ext cx="5172779" cy="5100825"/>
           </a:xfrm>
           <a:prstGeom prst="rect">
             <a:avLst/>
           </a:prstGeom>
         </p:spPr>
       </p:pic>
+      <p:sp>
+        <p:nvSpPr>
+          <p:cNvPr id="5" name="TextBox 4"/>
+          <p:cNvSpPr txBox="1"/>
+          <p:nvPr/>
+        </p:nvSpPr>
+        <p:spPr>
+          <a:xfrm>
+            <a:off x="273415" y="6133870"/>
+            <a:ext cx="11170166" cy="738664"/>
+          </a:xfrm>
+          <a:prstGeom prst="rect">
+            <a:avLst/>
+          </a:prstGeom>
+          <a:noFill/>
+        </p:spPr>
+        <p:txBody>
+          <a:bodyPr wrap="square" rtlCol="0">
+            <a:spAutoFit/>
+          </a:bodyPr>
+          <a:lstStyle/>
+          <a:p>
+            <a:r>
+              <a:rPr lang="en-IN" sz="1050" dirty="0"/>
+              <a:t>K. </a:t>
+            </a:r>
+            <a:r>
+              <a:rPr lang="en-IN" sz="1050" dirty="0" err="1"/>
+              <a:t>Petrou</a:t>
+            </a:r>
+            <a:r>
+              <a:rPr lang="en-IN" sz="1050" dirty="0"/>
+              <a:t>, A. T. </a:t>
+            </a:r>
+            <a:r>
+              <a:rPr lang="en-IN" sz="1050" dirty="0" err="1"/>
+              <a:t>Procopiou</a:t>
+            </a:r>
+            <a:r>
+              <a:rPr lang="en-IN" sz="1050" dirty="0"/>
+              <a:t>, L. Gutierrez-Lagos, M. Z. Liu, L. F. Ochoa, T. </a:t>
+            </a:r>
+            <a:r>
+              <a:rPr lang="en-IN" sz="1050" dirty="0" err="1"/>
+              <a:t>Langstaff</a:t>
+            </a:r>
+            <a:r>
+              <a:rPr lang="en-IN" sz="1050" dirty="0"/>
+              <a:t>, </a:t>
+            </a:r>
+            <a:r>
+              <a:rPr lang="en-IN" sz="1050" dirty="0" smtClean="0"/>
+              <a:t>and J</a:t>
+            </a:r>
+            <a:r>
+              <a:rPr lang="en-IN" sz="1050" dirty="0"/>
+              <a:t>. M. </a:t>
+            </a:r>
+            <a:r>
+              <a:rPr lang="en-IN" sz="1050" dirty="0" err="1"/>
+              <a:t>Theunissen</a:t>
+            </a:r>
+            <a:r>
+              <a:rPr lang="en-IN" sz="1050" dirty="0"/>
+              <a:t>, “Ensuring distribution network integrity using dynamic operating limits </a:t>
+            </a:r>
+            <a:r>
+              <a:rPr lang="en-IN" sz="1050" dirty="0" smtClean="0"/>
+              <a:t>for </a:t>
+            </a:r>
+            <a:r>
+              <a:rPr lang="en-IN" sz="1050" dirty="0" err="1" smtClean="0"/>
+              <a:t>prosumers</a:t>
+            </a:r>
+            <a:r>
+              <a:rPr lang="en-IN" sz="1050" dirty="0"/>
+              <a:t>,” IEEE </a:t>
+            </a:r>
+            <a:r>
+              <a:rPr lang="en-IN" sz="1050" dirty="0">
+                <a:solidFill>
+                  <a:schemeClr val="bg1"/>
+                </a:solidFill>
+              </a:rPr>
+              <a:t>Transactions on Smart Grid, vol. 12, no. 5, pp. 3877–3888, </a:t>
+            </a:r>
+            <a:r>
+              <a:rPr lang="en-IN" sz="1050" dirty="0" smtClean="0">
+                <a:solidFill>
+                  <a:schemeClr val="bg1"/>
+                </a:solidFill>
+              </a:rPr>
+              <a:t>2021</a:t>
+            </a:r>
+          </a:p>
+          <a:p>
+            <a:r>
+              <a:rPr lang="en-IN" sz="1050" dirty="0" smtClean="0">
+                <a:solidFill>
+                  <a:schemeClr val="bg1"/>
+                </a:solidFill>
+              </a:rPr>
+              <a:t>M</a:t>
+            </a:r>
+            <a:r>
+              <a:rPr lang="en-IN" sz="1050" dirty="0">
+                <a:solidFill>
+                  <a:schemeClr val="bg1"/>
+                </a:solidFill>
+              </a:rPr>
+              <a:t>. </a:t>
+            </a:r>
+            <a:r>
+              <a:rPr lang="en-IN" sz="1050" dirty="0" err="1">
+                <a:solidFill>
+                  <a:schemeClr val="bg1"/>
+                </a:solidFill>
+              </a:rPr>
+              <a:t>Alam</a:t>
+            </a:r>
+            <a:r>
+              <a:rPr lang="en-IN" sz="1050" dirty="0">
+                <a:solidFill>
+                  <a:schemeClr val="bg1"/>
+                </a:solidFill>
+              </a:rPr>
+              <a:t>, P. T. Nguyen, L. </a:t>
+            </a:r>
+            <a:r>
+              <a:rPr lang="en-IN" sz="1050" dirty="0" err="1">
+                <a:solidFill>
+                  <a:schemeClr val="bg1"/>
+                </a:solidFill>
+              </a:rPr>
+              <a:t>Naranpanawe</a:t>
+            </a:r>
+            <a:r>
+              <a:rPr lang="en-IN" sz="1050" dirty="0">
+                <a:solidFill>
+                  <a:schemeClr val="bg1"/>
+                </a:solidFill>
+              </a:rPr>
+              <a:t>, T. K. </a:t>
+            </a:r>
+            <a:r>
+              <a:rPr lang="en-IN" sz="1050" dirty="0" err="1">
+                <a:solidFill>
+                  <a:schemeClr val="bg1"/>
+                </a:solidFill>
+              </a:rPr>
+              <a:t>Saha</a:t>
+            </a:r>
+            <a:r>
+              <a:rPr lang="en-IN" sz="1050" dirty="0">
+                <a:solidFill>
+                  <a:schemeClr val="bg1"/>
+                </a:solidFill>
+              </a:rPr>
+              <a:t>, and G. </a:t>
+            </a:r>
+            <a:r>
+              <a:rPr lang="en-IN" sz="1050" dirty="0" err="1">
+                <a:solidFill>
+                  <a:schemeClr val="bg1"/>
+                </a:solidFill>
+              </a:rPr>
+              <a:t>Lankeshwara</a:t>
+            </a:r>
+            <a:r>
+              <a:rPr lang="en-IN" sz="1050" dirty="0">
+                <a:solidFill>
+                  <a:schemeClr val="bg1"/>
+                </a:solidFill>
+              </a:rPr>
+              <a:t>, “Allocation </a:t>
+            </a:r>
+            <a:r>
+              <a:rPr lang="en-IN" sz="1050" dirty="0" smtClean="0">
+                <a:solidFill>
+                  <a:schemeClr val="bg1"/>
+                </a:solidFill>
+              </a:rPr>
+              <a:t>of dynamic </a:t>
+            </a:r>
+            <a:r>
+              <a:rPr lang="en-IN" sz="1050" dirty="0">
+                <a:solidFill>
+                  <a:schemeClr val="bg1"/>
+                </a:solidFill>
+              </a:rPr>
+              <a:t>operating envelopes in distribution networks: Technical and equitable perspectives</a:t>
+            </a:r>
+            <a:r>
+              <a:rPr lang="en-IN" sz="1050" dirty="0" smtClean="0">
+                <a:solidFill>
+                  <a:schemeClr val="bg1"/>
+                </a:solidFill>
+              </a:rPr>
+              <a:t>,” IEEE </a:t>
+            </a:r>
+            <a:r>
+              <a:rPr lang="en-IN" sz="1050" dirty="0">
+                <a:solidFill>
+                  <a:schemeClr val="bg1"/>
+                </a:solidFill>
+              </a:rPr>
+              <a:t>Transactions on Sustainable Energy, 2023.</a:t>
+            </a:r>
+          </a:p>
+        </p:txBody>
+      </p:sp>
+      <p:cxnSp>
+        <p:nvCxnSpPr>
+          <p:cNvPr id="7" name="Straight Connector 6"/>
+          <p:cNvCxnSpPr/>
+          <p:nvPr/>
+        </p:nvCxnSpPr>
+        <p:spPr>
+          <a:xfrm flipH="1">
+            <a:off x="1097280" y="910188"/>
+            <a:ext cx="10058401" cy="22323"/>
+          </a:xfrm>
+          <a:prstGeom prst="line">
+            <a:avLst/>
+          </a:prstGeom>
+          <a:ln w="3175">
+            <a:solidFill>
+              <a:schemeClr val="tx1"/>
+            </a:solidFill>
+          </a:ln>
+        </p:spPr>
+        <p:style>
+          <a:lnRef idx="1">
+            <a:schemeClr val="accent1"/>
+          </a:lnRef>
+          <a:fillRef idx="0">
+            <a:schemeClr val="accent1"/>
+          </a:fillRef>
+          <a:effectRef idx="0">
+            <a:schemeClr val="accent1"/>
+          </a:effectRef>
+          <a:fontRef idx="minor">
+            <a:schemeClr val="tx1"/>
+          </a:fontRef>
+        </p:style>
+      </p:cxnSp>
+      <p:pic>
+        <p:nvPicPr>
+          <p:cNvPr id="10" name="Picture 9"/>
+          <p:cNvPicPr>
+            <a:picLocks noChangeAspect="1"/>
+          </p:cNvPicPr>
+          <p:nvPr/>
+        </p:nvPicPr>
+        <p:blipFill>
+          <a:blip r:embed="rId3"/>
+          <a:stretch>
+            <a:fillRect/>
+          </a:stretch>
+        </p:blipFill>
+        <p:spPr>
+          <a:xfrm>
+            <a:off x="671946" y="1207567"/>
+            <a:ext cx="5198171" cy="4735971"/>
+          </a:xfrm>
+          <a:prstGeom prst="rect">
+            <a:avLst/>
+          </a:prstGeom>
+        </p:spPr>
+      </p:pic>
+      <p:cxnSp>
+        <p:nvCxnSpPr>
+          <p:cNvPr id="11" name="Straight Connector 10"/>
+          <p:cNvCxnSpPr/>
+          <p:nvPr/>
+        </p:nvCxnSpPr>
+        <p:spPr>
+          <a:xfrm flipV="1">
+            <a:off x="6137363" y="1058769"/>
+            <a:ext cx="0" cy="5080695"/>
+          </a:xfrm>
+          <a:prstGeom prst="line">
+            <a:avLst/>
+          </a:prstGeom>
+          <a:ln w="3175">
+            <a:solidFill>
+              <a:schemeClr val="tx1"/>
+            </a:solidFill>
+          </a:ln>
+        </p:spPr>
+        <p:style>
+          <a:lnRef idx="1">
+            <a:schemeClr val="accent1"/>
+          </a:lnRef>
+          <a:fillRef idx="0">
+            <a:schemeClr val="accent1"/>
+          </a:fillRef>
+          <a:effectRef idx="0">
+            <a:schemeClr val="accent1"/>
+          </a:effectRef>
+          <a:fontRef idx="minor">
+            <a:schemeClr val="tx1"/>
+          </a:fontRef>
+        </p:style>
+      </p:cxnSp>
     </p:spTree>
     <p:extLst>
       <p:ext uri="{BB962C8B-B14F-4D97-AF65-F5344CB8AC3E}">
-        <p14:creationId xmlns:p14="http://schemas.microsoft.com/office/powerpoint/2010/main" val="3497950864"/>
+        <p14:creationId xmlns:p14="http://schemas.microsoft.com/office/powerpoint/2010/main" val="758725151"/>
       </p:ext>
     </p:extLst>
   </p:cSld>
@@ -4390,10 +5400,18 @@
           <a:lstStyle/>
           <a:p>
             <a:r>
-              <a:rPr lang="en-IN" dirty="0" smtClean="0"/>
-              <a:t>Calculating Operating Envelope</a:t>
-            </a:r>
-            <a:endParaRPr lang="en-IN" dirty="0"/>
+              <a:rPr lang="en-IN" dirty="0" smtClean="0">
+                <a:solidFill>
+                  <a:schemeClr val="accent1"/>
+                </a:solidFill>
+              </a:rPr>
+              <a:t>DOE control framework</a:t>
+            </a:r>
+            <a:endParaRPr lang="en-IN" dirty="0">
+              <a:solidFill>
+                <a:schemeClr val="accent1"/>
+              </a:solidFill>
+            </a:endParaRPr>
           </a:p>
         </p:txBody>
       </p:sp>
@@ -4406,26 +5424,463 @@
           <p:nvPr/>
         </p:nvPicPr>
         <p:blipFill>
-          <a:blip r:embed="rId2">
-            <a:clrChange>
-              <a:clrFrom>
-                <a:srgbClr val="E4DDE7"/>
-              </a:clrFrom>
-              <a:clrTo>
-                <a:srgbClr val="E4DDE7">
-                  <a:alpha val="0"/>
-                </a:srgbClr>
-              </a:clrTo>
-            </a:clrChange>
-          </a:blip>
+          <a:blip r:embed="rId2"/>
           <a:stretch>
             <a:fillRect/>
           </a:stretch>
         </p:blipFill>
         <p:spPr>
           <a:xfrm>
-            <a:off x="2171152" y="2119129"/>
-            <a:ext cx="7849695" cy="2619741"/>
+            <a:off x="2442875" y="1885805"/>
+            <a:ext cx="7367210" cy="3955281"/>
+          </a:xfrm>
+          <a:prstGeom prst="rect">
+            <a:avLst/>
+          </a:prstGeom>
+        </p:spPr>
+      </p:pic>
+      <p:sp>
+        <p:nvSpPr>
+          <p:cNvPr id="5" name="Slide Number Placeholder 4"/>
+          <p:cNvSpPr>
+            <a:spLocks noGrp="1"/>
+          </p:cNvSpPr>
+          <p:nvPr>
+            <p:ph type="sldNum" sz="quarter" idx="12"/>
+          </p:nvPr>
+        </p:nvSpPr>
+        <p:spPr/>
+        <p:txBody>
+          <a:bodyPr/>
+          <a:lstStyle/>
+          <a:p>
+            <a:fld id="{806BD4E3-0125-423E-A2AC-3792473F6B73}" type="slidenum">
+              <a:rPr lang="en-IN" smtClean="0"/>
+              <a:t>6</a:t>
+            </a:fld>
+            <a:endParaRPr lang="en-IN"/>
+          </a:p>
+        </p:txBody>
+      </p:sp>
+      <p:sp>
+        <p:nvSpPr>
+          <p:cNvPr id="6" name="TextBox 5"/>
+          <p:cNvSpPr txBox="1"/>
+          <p:nvPr/>
+        </p:nvSpPr>
+        <p:spPr>
+          <a:xfrm>
+            <a:off x="273415" y="6414520"/>
+            <a:ext cx="11170166" cy="253916"/>
+          </a:xfrm>
+          <a:prstGeom prst="rect">
+            <a:avLst/>
+          </a:prstGeom>
+          <a:noFill/>
+        </p:spPr>
+        <p:txBody>
+          <a:bodyPr wrap="square" rtlCol="0">
+            <a:spAutoFit/>
+          </a:bodyPr>
+          <a:lstStyle/>
+          <a:p>
+            <a:r>
+              <a:rPr lang="en-IN" sz="1050" dirty="0">
+                <a:solidFill>
+                  <a:schemeClr val="bg1"/>
+                </a:solidFill>
+              </a:rPr>
+              <a:t>Y. Z. </a:t>
+            </a:r>
+            <a:r>
+              <a:rPr lang="en-IN" sz="1050" dirty="0" err="1">
+                <a:solidFill>
+                  <a:schemeClr val="bg1"/>
+                </a:solidFill>
+              </a:rPr>
+              <a:t>Gerdroodbari</a:t>
+            </a:r>
+            <a:r>
+              <a:rPr lang="en-IN" sz="1050" dirty="0">
+                <a:solidFill>
+                  <a:schemeClr val="bg1"/>
+                </a:solidFill>
+              </a:rPr>
+              <a:t>, M. </a:t>
+            </a:r>
+            <a:r>
+              <a:rPr lang="en-IN" sz="1050" dirty="0" err="1">
+                <a:solidFill>
+                  <a:schemeClr val="bg1"/>
+                </a:solidFill>
+              </a:rPr>
+              <a:t>Khorasany</a:t>
+            </a:r>
+            <a:r>
+              <a:rPr lang="en-IN" sz="1050" dirty="0">
+                <a:solidFill>
+                  <a:schemeClr val="bg1"/>
+                </a:solidFill>
+              </a:rPr>
+              <a:t>, and R. </a:t>
+            </a:r>
+            <a:r>
+              <a:rPr lang="en-IN" sz="1050" dirty="0" err="1">
+                <a:solidFill>
+                  <a:schemeClr val="bg1"/>
+                </a:solidFill>
+              </a:rPr>
+              <a:t>Razzaghi</a:t>
+            </a:r>
+            <a:r>
+              <a:rPr lang="en-IN" sz="1050" dirty="0">
+                <a:solidFill>
+                  <a:schemeClr val="bg1"/>
+                </a:solidFill>
+              </a:rPr>
+              <a:t>, “Dynamic </a:t>
+            </a:r>
+            <a:r>
+              <a:rPr lang="en-IN" sz="1050" dirty="0" err="1">
+                <a:solidFill>
+                  <a:schemeClr val="bg1"/>
+                </a:solidFill>
+              </a:rPr>
+              <a:t>pq</a:t>
+            </a:r>
+            <a:r>
+              <a:rPr lang="en-IN" sz="1050" dirty="0">
+                <a:solidFill>
+                  <a:schemeClr val="bg1"/>
+                </a:solidFill>
+              </a:rPr>
+              <a:t> operating envelopes </a:t>
+            </a:r>
+            <a:r>
+              <a:rPr lang="en-IN" sz="1050" dirty="0" smtClean="0">
+                <a:solidFill>
+                  <a:schemeClr val="bg1"/>
+                </a:solidFill>
+              </a:rPr>
+              <a:t>for </a:t>
+            </a:r>
+            <a:r>
+              <a:rPr lang="en-IN" sz="1050" dirty="0" err="1" smtClean="0">
+                <a:solidFill>
+                  <a:schemeClr val="bg1"/>
+                </a:solidFill>
+              </a:rPr>
+              <a:t>prosumers</a:t>
+            </a:r>
+            <a:r>
+              <a:rPr lang="en-IN" sz="1050" dirty="0" smtClean="0">
+                <a:solidFill>
+                  <a:schemeClr val="bg1"/>
+                </a:solidFill>
+              </a:rPr>
+              <a:t> </a:t>
+            </a:r>
+            <a:r>
+              <a:rPr lang="en-IN" sz="1050" dirty="0">
+                <a:solidFill>
+                  <a:schemeClr val="bg1"/>
+                </a:solidFill>
+              </a:rPr>
+              <a:t>in distribution networks,” Applied Energy, vol. 325, p. 119757, 2022.</a:t>
+            </a:r>
+          </a:p>
+        </p:txBody>
+      </p:sp>
+    </p:spTree>
+    <p:extLst>
+      <p:ext uri="{BB962C8B-B14F-4D97-AF65-F5344CB8AC3E}">
+        <p14:creationId xmlns:p14="http://schemas.microsoft.com/office/powerpoint/2010/main" val="940625499"/>
+      </p:ext>
+    </p:extLst>
+  </p:cSld>
+  <p:clrMapOvr>
+    <a:masterClrMapping/>
+  </p:clrMapOvr>
+</p:sld>
+</file>
+
+<file path=ppt/slides/slide7.xml><?xml version="1.0" encoding="utf-8"?>
+<p:sld xmlns:a="http://schemas.openxmlformats.org/drawingml/2006/main" xmlns:r="http://schemas.openxmlformats.org/officeDocument/2006/relationships" xmlns:p="http://schemas.openxmlformats.org/presentationml/2006/main">
+  <p:cSld>
+    <p:spTree>
+      <p:nvGrpSpPr>
+        <p:cNvPr id="1" name=""/>
+        <p:cNvGrpSpPr/>
+        <p:nvPr/>
+      </p:nvGrpSpPr>
+      <p:grpSpPr>
+        <a:xfrm>
+          <a:off x="0" y="0"/>
+          <a:ext cx="0" cy="0"/>
+          <a:chOff x="0" y="0"/>
+          <a:chExt cx="0" cy="0"/>
+        </a:xfrm>
+      </p:grpSpPr>
+      <p:sp>
+        <p:nvSpPr>
+          <p:cNvPr id="2" name="Slide Number Placeholder 1"/>
+          <p:cNvSpPr>
+            <a:spLocks noGrp="1"/>
+          </p:cNvSpPr>
+          <p:nvPr>
+            <p:ph type="sldNum" sz="quarter" idx="12"/>
+          </p:nvPr>
+        </p:nvSpPr>
+        <p:spPr/>
+        <p:txBody>
+          <a:bodyPr/>
+          <a:lstStyle/>
+          <a:p>
+            <a:fld id="{806BD4E3-0125-423E-A2AC-3792473F6B73}" type="slidenum">
+              <a:rPr lang="en-IN" smtClean="0"/>
+              <a:t>7</a:t>
+            </a:fld>
+            <a:endParaRPr lang="en-IN"/>
+          </a:p>
+        </p:txBody>
+      </p:sp>
+      <p:sp>
+        <p:nvSpPr>
+          <p:cNvPr id="3" name="Title 1"/>
+          <p:cNvSpPr txBox="1">
+            <a:spLocks/>
+          </p:cNvSpPr>
+          <p:nvPr/>
+        </p:nvSpPr>
+        <p:spPr>
+          <a:xfrm>
+            <a:off x="1097280" y="286603"/>
+            <a:ext cx="10058400" cy="1035203"/>
+          </a:xfrm>
+          <a:prstGeom prst="rect">
+            <a:avLst/>
+          </a:prstGeom>
+        </p:spPr>
+        <p:txBody>
+          <a:bodyPr/>
+          <a:lstStyle>
+            <a:lvl1pPr algn="l" defTabSz="914400" rtl="0" eaLnBrk="1" latinLnBrk="0" hangingPunct="1">
+              <a:lnSpc>
+                <a:spcPct val="85000"/>
+              </a:lnSpc>
+              <a:spcBef>
+                <a:spcPct val="0"/>
+              </a:spcBef>
+              <a:buNone/>
+              <a:defRPr sz="4800" kern="1200" spc="-50" baseline="0">
+                <a:solidFill>
+                  <a:schemeClr val="accent1"/>
+                </a:solidFill>
+                <a:latin typeface="+mj-lt"/>
+                <a:ea typeface="+mj-ea"/>
+                <a:cs typeface="+mj-cs"/>
+              </a:defRPr>
+            </a:lvl1pPr>
+          </a:lstStyle>
+          <a:p>
+            <a:r>
+              <a:rPr lang="en-IN" dirty="0" smtClean="0"/>
+              <a:t>DOE with Decomposition Method</a:t>
+            </a:r>
+            <a:endParaRPr lang="en-IN" dirty="0"/>
+          </a:p>
+        </p:txBody>
+      </p:sp>
+      <p:pic>
+        <p:nvPicPr>
+          <p:cNvPr id="4" name="Picture 3"/>
+          <p:cNvPicPr>
+            <a:picLocks noChangeAspect="1"/>
+          </p:cNvPicPr>
+          <p:nvPr/>
+        </p:nvPicPr>
+        <p:blipFill>
+          <a:blip r:embed="rId2"/>
+          <a:stretch>
+            <a:fillRect/>
+          </a:stretch>
+        </p:blipFill>
+        <p:spPr>
+          <a:xfrm>
+            <a:off x="541247" y="1311727"/>
+            <a:ext cx="5585233" cy="3940587"/>
+          </a:xfrm>
+          <a:prstGeom prst="rect">
+            <a:avLst/>
+          </a:prstGeom>
+        </p:spPr>
+      </p:pic>
+      <p:cxnSp>
+        <p:nvCxnSpPr>
+          <p:cNvPr id="5" name="Straight Connector 4"/>
+          <p:cNvCxnSpPr/>
+          <p:nvPr/>
+        </p:nvCxnSpPr>
+        <p:spPr>
+          <a:xfrm flipH="1">
+            <a:off x="1097280" y="973559"/>
+            <a:ext cx="10058401" cy="22323"/>
+          </a:xfrm>
+          <a:prstGeom prst="line">
+            <a:avLst/>
+          </a:prstGeom>
+          <a:ln w="3175">
+            <a:solidFill>
+              <a:schemeClr val="tx1"/>
+            </a:solidFill>
+          </a:ln>
+        </p:spPr>
+        <p:style>
+          <a:lnRef idx="1">
+            <a:schemeClr val="accent1"/>
+          </a:lnRef>
+          <a:fillRef idx="0">
+            <a:schemeClr val="accent1"/>
+          </a:fillRef>
+          <a:effectRef idx="0">
+            <a:schemeClr val="accent1"/>
+          </a:effectRef>
+          <a:fontRef idx="minor">
+            <a:schemeClr val="tx1"/>
+          </a:fontRef>
+        </p:style>
+      </p:cxnSp>
+      <p:sp>
+        <p:nvSpPr>
+          <p:cNvPr id="6" name="TextBox 5"/>
+          <p:cNvSpPr txBox="1"/>
+          <p:nvPr/>
+        </p:nvSpPr>
+        <p:spPr>
+          <a:xfrm>
+            <a:off x="273415" y="6414520"/>
+            <a:ext cx="11170166" cy="415498"/>
+          </a:xfrm>
+          <a:prstGeom prst="rect">
+            <a:avLst/>
+          </a:prstGeom>
+          <a:noFill/>
+        </p:spPr>
+        <p:txBody>
+          <a:bodyPr wrap="square" rtlCol="0">
+            <a:spAutoFit/>
+          </a:bodyPr>
+          <a:lstStyle/>
+          <a:p>
+            <a:r>
+              <a:rPr lang="en-IN" sz="1050" dirty="0" smtClean="0">
+                <a:solidFill>
+                  <a:schemeClr val="bg1"/>
+                </a:solidFill>
+              </a:rPr>
+              <a:t>M. </a:t>
+            </a:r>
+            <a:r>
+              <a:rPr lang="en-IN" sz="1050" dirty="0" err="1">
+                <a:solidFill>
+                  <a:schemeClr val="bg1"/>
+                </a:solidFill>
+              </a:rPr>
+              <a:t>Mahmoodi</a:t>
+            </a:r>
+            <a:r>
+              <a:rPr lang="en-IN" sz="1050" dirty="0">
+                <a:solidFill>
+                  <a:schemeClr val="bg1"/>
+                </a:solidFill>
+              </a:rPr>
+              <a:t>, L. </a:t>
+            </a:r>
+            <a:r>
+              <a:rPr lang="en-IN" sz="1050" dirty="0" err="1">
+                <a:solidFill>
+                  <a:schemeClr val="bg1"/>
+                </a:solidFill>
+              </a:rPr>
+              <a:t>Blackhall</a:t>
+            </a:r>
+            <a:r>
+              <a:rPr lang="en-IN" sz="1050" dirty="0">
+                <a:solidFill>
+                  <a:schemeClr val="bg1"/>
+                </a:solidFill>
+              </a:rPr>
+              <a:t>, S. M. N. RA, A. </a:t>
+            </a:r>
+            <a:r>
+              <a:rPr lang="en-IN" sz="1050" dirty="0" err="1">
+                <a:solidFill>
+                  <a:schemeClr val="bg1"/>
+                </a:solidFill>
+              </a:rPr>
+              <a:t>Attarha</a:t>
+            </a:r>
+            <a:r>
+              <a:rPr lang="en-IN" sz="1050" dirty="0">
+                <a:solidFill>
+                  <a:schemeClr val="bg1"/>
+                </a:solidFill>
+              </a:rPr>
+              <a:t>, B. Weise, and A. Bhardwaj, “Der </a:t>
+            </a:r>
+            <a:r>
+              <a:rPr lang="en-IN" sz="1050" dirty="0" smtClean="0">
+                <a:solidFill>
+                  <a:schemeClr val="bg1"/>
+                </a:solidFill>
+              </a:rPr>
+              <a:t>capacity assessment </a:t>
+            </a:r>
+            <a:r>
+              <a:rPr lang="en-IN" sz="1050" dirty="0">
+                <a:solidFill>
+                  <a:schemeClr val="bg1"/>
+                </a:solidFill>
+              </a:rPr>
+              <a:t>of active distribution systems using dynamic operating envelopes,” IEEE </a:t>
+            </a:r>
+            <a:r>
+              <a:rPr lang="en-IN" sz="1050" dirty="0" smtClean="0">
+                <a:solidFill>
+                  <a:schemeClr val="bg1"/>
+                </a:solidFill>
+              </a:rPr>
+              <a:t>Transactions </a:t>
+            </a:r>
+            <a:r>
+              <a:rPr lang="en-IN" sz="1050" dirty="0">
+                <a:solidFill>
+                  <a:schemeClr val="bg1"/>
+                </a:solidFill>
+              </a:rPr>
+              <a:t>on Smart Grid, 2023</a:t>
+            </a:r>
+          </a:p>
+        </p:txBody>
+      </p:sp>
+      <p:pic>
+        <p:nvPicPr>
+          <p:cNvPr id="7" name="Picture 6"/>
+          <p:cNvPicPr>
+            <a:picLocks noChangeAspect="1"/>
+          </p:cNvPicPr>
+          <p:nvPr/>
+        </p:nvPicPr>
+        <p:blipFill>
+          <a:blip r:embed="rId3"/>
+          <a:stretch>
+            <a:fillRect/>
+          </a:stretch>
+        </p:blipFill>
+        <p:spPr>
+          <a:xfrm>
+            <a:off x="6600373" y="2008762"/>
+            <a:ext cx="5007987" cy="2423220"/>
           </a:xfrm>
           <a:prstGeom prst="rect">
             <a:avLst/>
@@ -4435,7 +5890,698 @@
     </p:spTree>
     <p:extLst>
       <p:ext uri="{BB962C8B-B14F-4D97-AF65-F5344CB8AC3E}">
-        <p14:creationId xmlns:p14="http://schemas.microsoft.com/office/powerpoint/2010/main" val="3175966176"/>
+        <p14:creationId xmlns:p14="http://schemas.microsoft.com/office/powerpoint/2010/main" val="3019265307"/>
+      </p:ext>
+    </p:extLst>
+  </p:cSld>
+  <p:clrMapOvr>
+    <a:masterClrMapping/>
+  </p:clrMapOvr>
+</p:sld>
+</file>
+
+<file path=ppt/slides/slide8.xml><?xml version="1.0" encoding="utf-8"?>
+<p:sld xmlns:a="http://schemas.openxmlformats.org/drawingml/2006/main" xmlns:r="http://schemas.openxmlformats.org/officeDocument/2006/relationships" xmlns:p="http://schemas.openxmlformats.org/presentationml/2006/main">
+  <p:cSld>
+    <p:spTree>
+      <p:nvGrpSpPr>
+        <p:cNvPr id="1" name=""/>
+        <p:cNvGrpSpPr/>
+        <p:nvPr/>
+      </p:nvGrpSpPr>
+      <p:grpSpPr>
+        <a:xfrm>
+          <a:off x="0" y="0"/>
+          <a:ext cx="0" cy="0"/>
+          <a:chOff x="0" y="0"/>
+          <a:chExt cx="0" cy="0"/>
+        </a:xfrm>
+      </p:grpSpPr>
+      <p:sp>
+        <p:nvSpPr>
+          <p:cNvPr id="2" name="Slide Number Placeholder 1"/>
+          <p:cNvSpPr>
+            <a:spLocks noGrp="1"/>
+          </p:cNvSpPr>
+          <p:nvPr>
+            <p:ph type="sldNum" sz="quarter" idx="12"/>
+          </p:nvPr>
+        </p:nvSpPr>
+        <p:spPr/>
+        <p:txBody>
+          <a:bodyPr/>
+          <a:lstStyle/>
+          <a:p>
+            <a:fld id="{806BD4E3-0125-423E-A2AC-3792473F6B73}" type="slidenum">
+              <a:rPr lang="en-IN" smtClean="0"/>
+              <a:t>8</a:t>
+            </a:fld>
+            <a:endParaRPr lang="en-IN"/>
+          </a:p>
+        </p:txBody>
+      </p:sp>
+      <p:sp>
+        <p:nvSpPr>
+          <p:cNvPr id="3" name="Title 1"/>
+          <p:cNvSpPr txBox="1">
+            <a:spLocks/>
+          </p:cNvSpPr>
+          <p:nvPr/>
+        </p:nvSpPr>
+        <p:spPr>
+          <a:xfrm>
+            <a:off x="1097280" y="286603"/>
+            <a:ext cx="10058400" cy="1035203"/>
+          </a:xfrm>
+          <a:prstGeom prst="rect">
+            <a:avLst/>
+          </a:prstGeom>
+        </p:spPr>
+        <p:txBody>
+          <a:bodyPr/>
+          <a:lstStyle>
+            <a:lvl1pPr algn="l" defTabSz="914400" rtl="0" eaLnBrk="1" latinLnBrk="0" hangingPunct="1">
+              <a:lnSpc>
+                <a:spcPct val="85000"/>
+              </a:lnSpc>
+              <a:spcBef>
+                <a:spcPct val="0"/>
+              </a:spcBef>
+              <a:buNone/>
+              <a:defRPr sz="4800" kern="1200" spc="-50" baseline="0">
+                <a:solidFill>
+                  <a:schemeClr val="accent1"/>
+                </a:solidFill>
+                <a:latin typeface="+mj-lt"/>
+                <a:ea typeface="+mj-ea"/>
+                <a:cs typeface="+mj-cs"/>
+              </a:defRPr>
+            </a:lvl1pPr>
+          </a:lstStyle>
+          <a:p>
+            <a:r>
+              <a:rPr lang="en-IN" dirty="0" smtClean="0"/>
+              <a:t>DOE based market for </a:t>
+            </a:r>
+            <a:r>
+              <a:rPr lang="en-IN" dirty="0" err="1" smtClean="0"/>
+              <a:t>Prosumers</a:t>
+            </a:r>
+            <a:endParaRPr lang="en-IN" dirty="0"/>
+          </a:p>
+        </p:txBody>
+      </p:sp>
+      <p:cxnSp>
+        <p:nvCxnSpPr>
+          <p:cNvPr id="5" name="Straight Connector 4"/>
+          <p:cNvCxnSpPr/>
+          <p:nvPr/>
+        </p:nvCxnSpPr>
+        <p:spPr>
+          <a:xfrm flipH="1">
+            <a:off x="1097280" y="973559"/>
+            <a:ext cx="10058401" cy="22323"/>
+          </a:xfrm>
+          <a:prstGeom prst="line">
+            <a:avLst/>
+          </a:prstGeom>
+          <a:ln w="3175">
+            <a:solidFill>
+              <a:schemeClr val="tx1"/>
+            </a:solidFill>
+          </a:ln>
+        </p:spPr>
+        <p:style>
+          <a:lnRef idx="1">
+            <a:schemeClr val="accent1"/>
+          </a:lnRef>
+          <a:fillRef idx="0">
+            <a:schemeClr val="accent1"/>
+          </a:fillRef>
+          <a:effectRef idx="0">
+            <a:schemeClr val="accent1"/>
+          </a:effectRef>
+          <a:fontRef idx="minor">
+            <a:schemeClr val="tx1"/>
+          </a:fontRef>
+        </p:style>
+      </p:cxnSp>
+      <p:sp>
+        <p:nvSpPr>
+          <p:cNvPr id="6" name="TextBox 5"/>
+          <p:cNvSpPr txBox="1"/>
+          <p:nvPr/>
+        </p:nvSpPr>
+        <p:spPr>
+          <a:xfrm>
+            <a:off x="273415" y="6342096"/>
+            <a:ext cx="11170166" cy="577081"/>
+          </a:xfrm>
+          <a:prstGeom prst="rect">
+            <a:avLst/>
+          </a:prstGeom>
+          <a:noFill/>
+        </p:spPr>
+        <p:txBody>
+          <a:bodyPr wrap="square" rtlCol="0">
+            <a:spAutoFit/>
+          </a:bodyPr>
+          <a:lstStyle/>
+          <a:p>
+            <a:r>
+              <a:rPr lang="en-IN" sz="1050" dirty="0" smtClean="0">
+                <a:solidFill>
+                  <a:schemeClr val="bg1"/>
+                </a:solidFill>
+              </a:rPr>
+              <a:t>M</a:t>
+            </a:r>
+            <a:r>
+              <a:rPr lang="en-IN" sz="1050" dirty="0">
+                <a:solidFill>
+                  <a:schemeClr val="bg1"/>
+                </a:solidFill>
+              </a:rPr>
+              <a:t>. I. </a:t>
+            </a:r>
+            <a:r>
+              <a:rPr lang="en-IN" sz="1050" dirty="0" err="1">
+                <a:solidFill>
+                  <a:schemeClr val="bg1"/>
+                </a:solidFill>
+              </a:rPr>
+              <a:t>Azim</a:t>
+            </a:r>
+            <a:r>
+              <a:rPr lang="en-IN" sz="1050" dirty="0">
+                <a:solidFill>
+                  <a:schemeClr val="bg1"/>
+                </a:solidFill>
+              </a:rPr>
+              <a:t>, G. </a:t>
+            </a:r>
+            <a:r>
+              <a:rPr lang="en-IN" sz="1050" dirty="0" err="1">
+                <a:solidFill>
+                  <a:schemeClr val="bg1"/>
+                </a:solidFill>
+              </a:rPr>
+              <a:t>Lankeshwara</a:t>
+            </a:r>
+            <a:r>
+              <a:rPr lang="en-IN" sz="1050" dirty="0">
+                <a:solidFill>
+                  <a:schemeClr val="bg1"/>
+                </a:solidFill>
+              </a:rPr>
+              <a:t>, W. </a:t>
+            </a:r>
+            <a:r>
+              <a:rPr lang="en-IN" sz="1050" dirty="0" err="1">
+                <a:solidFill>
+                  <a:schemeClr val="bg1"/>
+                </a:solidFill>
+              </a:rPr>
+              <a:t>Tushar</a:t>
+            </a:r>
+            <a:r>
+              <a:rPr lang="en-IN" sz="1050" dirty="0">
+                <a:solidFill>
+                  <a:schemeClr val="bg1"/>
+                </a:solidFill>
+              </a:rPr>
+              <a:t>, R. Sharma, M. R. </a:t>
+            </a:r>
+            <a:r>
+              <a:rPr lang="en-IN" sz="1050" dirty="0" err="1">
+                <a:solidFill>
+                  <a:schemeClr val="bg1"/>
+                </a:solidFill>
+              </a:rPr>
+              <a:t>Alam</a:t>
+            </a:r>
+            <a:r>
+              <a:rPr lang="en-IN" sz="1050" dirty="0">
+                <a:solidFill>
+                  <a:schemeClr val="bg1"/>
+                </a:solidFill>
+              </a:rPr>
+              <a:t>, T. K. </a:t>
+            </a:r>
+            <a:r>
+              <a:rPr lang="en-IN" sz="1050" dirty="0" err="1">
+                <a:solidFill>
+                  <a:schemeClr val="bg1"/>
+                </a:solidFill>
+              </a:rPr>
+              <a:t>Saha</a:t>
+            </a:r>
+            <a:r>
+              <a:rPr lang="en-IN" sz="1050" dirty="0">
+                <a:solidFill>
+                  <a:schemeClr val="bg1"/>
+                </a:solidFill>
+              </a:rPr>
+              <a:t>, M. </a:t>
+            </a:r>
+            <a:r>
+              <a:rPr lang="en-IN" sz="1050" dirty="0" err="1">
+                <a:solidFill>
+                  <a:schemeClr val="bg1"/>
+                </a:solidFill>
+              </a:rPr>
+              <a:t>Khorasany</a:t>
+            </a:r>
+            <a:r>
+              <a:rPr lang="en-IN" sz="1050" dirty="0">
+                <a:solidFill>
+                  <a:schemeClr val="bg1"/>
+                </a:solidFill>
+              </a:rPr>
+              <a:t>, </a:t>
+            </a:r>
+            <a:r>
+              <a:rPr lang="en-IN" sz="1050" dirty="0" smtClean="0">
+                <a:solidFill>
+                  <a:schemeClr val="bg1"/>
+                </a:solidFill>
+              </a:rPr>
+              <a:t>and R</a:t>
+            </a:r>
+            <a:r>
+              <a:rPr lang="en-IN" sz="1050" dirty="0">
+                <a:solidFill>
+                  <a:schemeClr val="bg1"/>
+                </a:solidFill>
+              </a:rPr>
+              <a:t>. </a:t>
+            </a:r>
+            <a:r>
+              <a:rPr lang="en-IN" sz="1050" dirty="0" err="1">
+                <a:solidFill>
+                  <a:schemeClr val="bg1"/>
+                </a:solidFill>
+              </a:rPr>
+              <a:t>Razzaghi</a:t>
+            </a:r>
+            <a:r>
+              <a:rPr lang="en-IN" sz="1050" dirty="0">
+                <a:solidFill>
+                  <a:schemeClr val="bg1"/>
+                </a:solidFill>
+              </a:rPr>
+              <a:t>, “Dynamic operating envelope-enabled p2p trading to maximise financial returns </a:t>
+            </a:r>
+            <a:r>
+              <a:rPr lang="en-IN" sz="1050" dirty="0" smtClean="0">
+                <a:solidFill>
+                  <a:schemeClr val="bg1"/>
+                </a:solidFill>
+              </a:rPr>
+              <a:t>of </a:t>
+            </a:r>
+            <a:r>
+              <a:rPr lang="en-IN" sz="1050" dirty="0" err="1" smtClean="0">
+                <a:solidFill>
+                  <a:schemeClr val="bg1"/>
+                </a:solidFill>
+              </a:rPr>
+              <a:t>prosumers</a:t>
+            </a:r>
+            <a:r>
+              <a:rPr lang="en-IN" sz="1050" dirty="0">
+                <a:solidFill>
+                  <a:schemeClr val="bg1"/>
+                </a:solidFill>
+              </a:rPr>
+              <a:t>,” IEEE Transactions on Smart Grid, </a:t>
+            </a:r>
+            <a:r>
+              <a:rPr lang="en-IN" sz="1050" dirty="0" smtClean="0">
+                <a:solidFill>
+                  <a:schemeClr val="bg1"/>
+                </a:solidFill>
+              </a:rPr>
+              <a:t>2023</a:t>
+            </a:r>
+          </a:p>
+          <a:p>
+            <a:r>
+              <a:rPr lang="en-IN" sz="1050" dirty="0">
+                <a:solidFill>
+                  <a:schemeClr val="bg1"/>
+                </a:solidFill>
+              </a:rPr>
+              <a:t>M. M. </a:t>
+            </a:r>
+            <a:r>
+              <a:rPr lang="en-IN" sz="1050" dirty="0" err="1">
+                <a:solidFill>
+                  <a:schemeClr val="bg1"/>
+                </a:solidFill>
+              </a:rPr>
+              <a:t>Hoque</a:t>
+            </a:r>
+            <a:r>
+              <a:rPr lang="en-IN" sz="1050" dirty="0">
+                <a:solidFill>
+                  <a:schemeClr val="bg1"/>
+                </a:solidFill>
+              </a:rPr>
+              <a:t>, M. </a:t>
+            </a:r>
+            <a:r>
+              <a:rPr lang="en-IN" sz="1050" dirty="0" err="1">
+                <a:solidFill>
+                  <a:schemeClr val="bg1"/>
+                </a:solidFill>
+              </a:rPr>
+              <a:t>Khorasany</a:t>
+            </a:r>
+            <a:r>
+              <a:rPr lang="en-IN" sz="1050" dirty="0">
+                <a:solidFill>
+                  <a:schemeClr val="bg1"/>
+                </a:solidFill>
+              </a:rPr>
+              <a:t>, M. I. </a:t>
+            </a:r>
+            <a:r>
+              <a:rPr lang="en-IN" sz="1050" dirty="0" err="1">
+                <a:solidFill>
+                  <a:schemeClr val="bg1"/>
+                </a:solidFill>
+              </a:rPr>
+              <a:t>Azim</a:t>
+            </a:r>
+            <a:r>
+              <a:rPr lang="en-IN" sz="1050" dirty="0">
+                <a:solidFill>
+                  <a:schemeClr val="bg1"/>
+                </a:solidFill>
+              </a:rPr>
+              <a:t>, R. </a:t>
+            </a:r>
+            <a:r>
+              <a:rPr lang="en-IN" sz="1050" dirty="0" err="1">
+                <a:solidFill>
+                  <a:schemeClr val="bg1"/>
+                </a:solidFill>
+              </a:rPr>
+              <a:t>Razzaghi</a:t>
+            </a:r>
+            <a:r>
+              <a:rPr lang="en-IN" sz="1050" dirty="0">
+                <a:solidFill>
+                  <a:schemeClr val="bg1"/>
+                </a:solidFill>
+              </a:rPr>
+              <a:t>, and M. </a:t>
+            </a:r>
+            <a:r>
+              <a:rPr lang="en-IN" sz="1050" dirty="0" err="1">
+                <a:solidFill>
+                  <a:schemeClr val="bg1"/>
+                </a:solidFill>
+              </a:rPr>
+              <a:t>Jalili</a:t>
+            </a:r>
+            <a:r>
+              <a:rPr lang="en-IN" sz="1050" dirty="0">
+                <a:solidFill>
+                  <a:schemeClr val="bg1"/>
+                </a:solidFill>
+              </a:rPr>
+              <a:t>, “Dynamic operating envelope-based local energy market for </a:t>
+            </a:r>
+            <a:r>
+              <a:rPr lang="en-IN" sz="1050" dirty="0" err="1">
+                <a:solidFill>
+                  <a:schemeClr val="bg1"/>
+                </a:solidFill>
+              </a:rPr>
+              <a:t>prosumers</a:t>
+            </a:r>
+            <a:r>
+              <a:rPr lang="en-IN" sz="1050" dirty="0">
+                <a:solidFill>
+                  <a:schemeClr val="bg1"/>
+                </a:solidFill>
+              </a:rPr>
+              <a:t> with electric vehicles,” IEEE Transactions on Smart Grid, </a:t>
+            </a:r>
+            <a:r>
+              <a:rPr lang="en-IN" sz="1050" dirty="0" smtClean="0">
+                <a:solidFill>
+                  <a:schemeClr val="bg1"/>
+                </a:solidFill>
+              </a:rPr>
+              <a:t>2023</a:t>
+            </a:r>
+            <a:endParaRPr lang="en-IN" sz="1050" dirty="0">
+              <a:solidFill>
+                <a:schemeClr val="bg1"/>
+              </a:solidFill>
+            </a:endParaRPr>
+          </a:p>
+        </p:txBody>
+      </p:sp>
+      <p:pic>
+        <p:nvPicPr>
+          <p:cNvPr id="7" name="Picture 6"/>
+          <p:cNvPicPr>
+            <a:picLocks noChangeAspect="1"/>
+          </p:cNvPicPr>
+          <p:nvPr/>
+        </p:nvPicPr>
+        <p:blipFill>
+          <a:blip r:embed="rId2"/>
+          <a:stretch>
+            <a:fillRect/>
+          </a:stretch>
+        </p:blipFill>
+        <p:spPr>
+          <a:xfrm>
+            <a:off x="8111016" y="1004935"/>
+            <a:ext cx="3878494" cy="5210901"/>
+          </a:xfrm>
+          <a:prstGeom prst="rect">
+            <a:avLst/>
+          </a:prstGeom>
+        </p:spPr>
+      </p:pic>
+      <p:pic>
+        <p:nvPicPr>
+          <p:cNvPr id="8" name="Picture 7"/>
+          <p:cNvPicPr>
+            <a:picLocks noChangeAspect="1"/>
+          </p:cNvPicPr>
+          <p:nvPr/>
+        </p:nvPicPr>
+        <p:blipFill>
+          <a:blip r:embed="rId3"/>
+          <a:stretch>
+            <a:fillRect/>
+          </a:stretch>
+        </p:blipFill>
+        <p:spPr>
+          <a:xfrm>
+            <a:off x="-36372" y="1682838"/>
+            <a:ext cx="7778107" cy="3984626"/>
+          </a:xfrm>
+          <a:prstGeom prst="rect">
+            <a:avLst/>
+          </a:prstGeom>
+        </p:spPr>
+      </p:pic>
+      <p:cxnSp>
+        <p:nvCxnSpPr>
+          <p:cNvPr id="9" name="Straight Connector 8"/>
+          <p:cNvCxnSpPr/>
+          <p:nvPr/>
+        </p:nvCxnSpPr>
+        <p:spPr>
+          <a:xfrm flipV="1">
+            <a:off x="7975217" y="1176460"/>
+            <a:ext cx="0" cy="5080695"/>
+          </a:xfrm>
+          <a:prstGeom prst="line">
+            <a:avLst/>
+          </a:prstGeom>
+          <a:ln w="3175">
+            <a:solidFill>
+              <a:schemeClr val="tx1"/>
+            </a:solidFill>
+          </a:ln>
+        </p:spPr>
+        <p:style>
+          <a:lnRef idx="1">
+            <a:schemeClr val="accent1"/>
+          </a:lnRef>
+          <a:fillRef idx="0">
+            <a:schemeClr val="accent1"/>
+          </a:fillRef>
+          <a:effectRef idx="0">
+            <a:schemeClr val="accent1"/>
+          </a:effectRef>
+          <a:fontRef idx="minor">
+            <a:schemeClr val="tx1"/>
+          </a:fontRef>
+        </p:style>
+      </p:cxnSp>
+    </p:spTree>
+    <p:extLst>
+      <p:ext uri="{BB962C8B-B14F-4D97-AF65-F5344CB8AC3E}">
+        <p14:creationId xmlns:p14="http://schemas.microsoft.com/office/powerpoint/2010/main" val="714626207"/>
+      </p:ext>
+    </p:extLst>
+  </p:cSld>
+  <p:clrMapOvr>
+    <a:masterClrMapping/>
+  </p:clrMapOvr>
+  <p:timing>
+    <p:tnLst>
+      <p:par>
+        <p:cTn id="1" dur="indefinite" restart="never" nodeType="tmRoot"/>
+      </p:par>
+    </p:tnLst>
+  </p:timing>
+</p:sld>
+</file>
+
+<file path=ppt/slides/slide9.xml><?xml version="1.0" encoding="utf-8"?>
+<p:sld xmlns:a="http://schemas.openxmlformats.org/drawingml/2006/main" xmlns:r="http://schemas.openxmlformats.org/officeDocument/2006/relationships" xmlns:p="http://schemas.openxmlformats.org/presentationml/2006/main">
+  <p:cSld>
+    <p:spTree>
+      <p:nvGrpSpPr>
+        <p:cNvPr id="1" name=""/>
+        <p:cNvGrpSpPr/>
+        <p:nvPr/>
+      </p:nvGrpSpPr>
+      <p:grpSpPr>
+        <a:xfrm>
+          <a:off x="0" y="0"/>
+          <a:ext cx="0" cy="0"/>
+          <a:chOff x="0" y="0"/>
+          <a:chExt cx="0" cy="0"/>
+        </a:xfrm>
+      </p:grpSpPr>
+      <p:sp>
+        <p:nvSpPr>
+          <p:cNvPr id="2" name="Title 1"/>
+          <p:cNvSpPr>
+            <a:spLocks noGrp="1"/>
+          </p:cNvSpPr>
+          <p:nvPr>
+            <p:ph type="title"/>
+          </p:nvPr>
+        </p:nvSpPr>
+        <p:spPr/>
+        <p:txBody>
+          <a:bodyPr/>
+          <a:lstStyle/>
+          <a:p>
+            <a:r>
+              <a:rPr lang="en-IN" dirty="0" smtClean="0"/>
+              <a:t>Summary</a:t>
+            </a:r>
+            <a:endParaRPr lang="en-IN" dirty="0"/>
+          </a:p>
+        </p:txBody>
+      </p:sp>
+      <p:sp>
+        <p:nvSpPr>
+          <p:cNvPr id="3" name="Content Placeholder 2"/>
+          <p:cNvSpPr>
+            <a:spLocks noGrp="1"/>
+          </p:cNvSpPr>
+          <p:nvPr>
+            <p:ph idx="1"/>
+          </p:nvPr>
+        </p:nvSpPr>
+        <p:spPr/>
+        <p:txBody>
+          <a:bodyPr/>
+          <a:lstStyle/>
+          <a:p>
+            <a:pPr>
+              <a:buFont typeface="Wingdings" panose="05000000000000000000" pitchFamily="2" charset="2"/>
+              <a:buChar char="Ø"/>
+            </a:pPr>
+            <a:r>
+              <a:rPr lang="en-IN" dirty="0" smtClean="0"/>
+              <a:t>DOEs are used for greater network efficiency and more market operation of DERs</a:t>
+            </a:r>
+          </a:p>
+          <a:p>
+            <a:pPr>
+              <a:buFont typeface="Wingdings" panose="05000000000000000000" pitchFamily="2" charset="2"/>
+              <a:buChar char="Ø"/>
+            </a:pPr>
+            <a:r>
+              <a:rPr lang="en-IN" dirty="0" smtClean="0"/>
+              <a:t>Main component of DOE is checking the network violations from power flow</a:t>
+            </a:r>
+          </a:p>
+          <a:p>
+            <a:pPr>
+              <a:buFont typeface="Wingdings" panose="05000000000000000000" pitchFamily="2" charset="2"/>
+              <a:buChar char="Ø"/>
+            </a:pPr>
+            <a:r>
+              <a:rPr lang="en-IN" dirty="0" smtClean="0"/>
+              <a:t>DOEs can be used with </a:t>
+            </a:r>
+            <a:r>
+              <a:rPr lang="en-IN" dirty="0" err="1" smtClean="0"/>
+              <a:t>prosumers</a:t>
+            </a:r>
+            <a:r>
+              <a:rPr lang="en-IN" dirty="0" smtClean="0"/>
+              <a:t> for electricity markets and shown to </a:t>
+            </a:r>
+            <a:r>
+              <a:rPr lang="en-IN" smtClean="0"/>
+              <a:t>be efficient</a:t>
+            </a:r>
+            <a:endParaRPr lang="en-IN" dirty="0" smtClean="0"/>
+          </a:p>
+          <a:p>
+            <a:pPr>
+              <a:buFont typeface="Wingdings" panose="05000000000000000000" pitchFamily="2" charset="2"/>
+              <a:buChar char="Ø"/>
+            </a:pPr>
+            <a:endParaRPr lang="en-IN" dirty="0"/>
+          </a:p>
+        </p:txBody>
+      </p:sp>
+      <p:sp>
+        <p:nvSpPr>
+          <p:cNvPr id="4" name="Slide Number Placeholder 3"/>
+          <p:cNvSpPr>
+            <a:spLocks noGrp="1"/>
+          </p:cNvSpPr>
+          <p:nvPr>
+            <p:ph type="sldNum" sz="quarter" idx="12"/>
+          </p:nvPr>
+        </p:nvSpPr>
+        <p:spPr/>
+        <p:txBody>
+          <a:bodyPr/>
+          <a:lstStyle/>
+          <a:p>
+            <a:fld id="{806BD4E3-0125-423E-A2AC-3792473F6B73}" type="slidenum">
+              <a:rPr lang="en-IN" smtClean="0"/>
+              <a:t>9</a:t>
+            </a:fld>
+            <a:endParaRPr lang="en-IN"/>
+          </a:p>
+        </p:txBody>
+      </p:sp>
+    </p:spTree>
+    <p:extLst>
+      <p:ext uri="{BB962C8B-B14F-4D97-AF65-F5344CB8AC3E}">
+        <p14:creationId xmlns:p14="http://schemas.microsoft.com/office/powerpoint/2010/main" val="3600965290"/>
       </p:ext>
     </p:extLst>
   </p:cSld>
@@ -4726,4 +6872,265 @@
     </a:ext>
   </a:extLst>
 </a:theme>
+</file>
+
+<file path=ppt/theme/theme2.xml><?xml version="1.0" encoding="utf-8"?>
+<a:theme xmlns:a="http://schemas.openxmlformats.org/drawingml/2006/main" name="Office Theme">
+  <a:themeElements>
+    <a:clrScheme name="Office">
+      <a:dk1>
+        <a:sysClr val="windowText" lastClr="000000"/>
+      </a:dk1>
+      <a:lt1>
+        <a:sysClr val="window" lastClr="FFFFFF"/>
+      </a:lt1>
+      <a:dk2>
+        <a:srgbClr val="44546A"/>
+      </a:dk2>
+      <a:lt2>
+        <a:srgbClr val="E7E6E6"/>
+      </a:lt2>
+      <a:accent1>
+        <a:srgbClr val="5B9BD5"/>
+      </a:accent1>
+      <a:accent2>
+        <a:srgbClr val="ED7D31"/>
+      </a:accent2>
+      <a:accent3>
+        <a:srgbClr val="A5A5A5"/>
+      </a:accent3>
+      <a:accent4>
+        <a:srgbClr val="FFC000"/>
+      </a:accent4>
+      <a:accent5>
+        <a:srgbClr val="4472C4"/>
+      </a:accent5>
+      <a:accent6>
+        <a:srgbClr val="70AD47"/>
+      </a:accent6>
+      <a:hlink>
+        <a:srgbClr val="0563C1"/>
+      </a:hlink>
+      <a:folHlink>
+        <a:srgbClr val="954F72"/>
+      </a:folHlink>
+    </a:clrScheme>
+    <a:fontScheme name="Office">
+      <a:majorFont>
+        <a:latin typeface="Calibri Light" panose="020F0302020204030204"/>
+        <a:ea typeface=""/>
+        <a:cs typeface=""/>
+        <a:font script="Jpan" typeface="ＭＳ Ｐゴシック"/>
+        <a:font script="Hang" typeface="맑은 고딕"/>
+        <a:font script="Hans" typeface="宋体"/>
+        <a:font script="Hant" typeface="新細明體"/>
+        <a:font script="Arab" typeface="Times New Roman"/>
+        <a:font script="Hebr" typeface="Times New Roman"/>
+        <a:font script="Thai" typeface="Angsana New"/>
+        <a:font script="Ethi" typeface="Nyala"/>
+        <a:font script="Beng" typeface="Vrinda"/>
+        <a:font script="Gujr" typeface="Shruti"/>
+        <a:font script="Khmr" typeface="MoolBoran"/>
+        <a:font script="Knda" typeface="Tunga"/>
+        <a:font script="Guru" typeface="Raavi"/>
+        <a:font script="Cans" typeface="Euphemia"/>
+        <a:font script="Cher" typeface="Plantagenet Cherokee"/>
+        <a:font script="Yiii" typeface="Microsoft Yi Baiti"/>
+        <a:font script="Tibt" typeface="Microsoft Himalaya"/>
+        <a:font script="Thaa" typeface="MV Boli"/>
+        <a:font script="Deva" typeface="Mangal"/>
+        <a:font script="Telu" typeface="Gautami"/>
+        <a:font script="Taml" typeface="Latha"/>
+        <a:font script="Syrc" typeface="Estrangelo Edessa"/>
+        <a:font script="Orya" typeface="Kalinga"/>
+        <a:font script="Mlym" typeface="Kartika"/>
+        <a:font script="Laoo" typeface="DokChampa"/>
+        <a:font script="Sinh" typeface="Iskoola Pota"/>
+        <a:font script="Mong" typeface="Mongolian Baiti"/>
+        <a:font script="Viet" typeface="Times New Roman"/>
+        <a:font script="Uigh" typeface="Microsoft Uighur"/>
+        <a:font script="Geor" typeface="Sylfaen"/>
+      </a:majorFont>
+      <a:minorFont>
+        <a:latin typeface="Calibri" panose="020F0502020204030204"/>
+        <a:ea typeface=""/>
+        <a:cs typeface=""/>
+        <a:font script="Jpan" typeface="ＭＳ Ｐゴシック"/>
+        <a:font script="Hang" typeface="맑은 고딕"/>
+        <a:font script="Hans" typeface="宋体"/>
+        <a:font script="Hant" typeface="新細明體"/>
+        <a:font script="Arab" typeface="Arial"/>
+        <a:font script="Hebr" typeface="Arial"/>
+        <a:font script="Thai" typeface="Cordia New"/>
+        <a:font script="Ethi" typeface="Nyala"/>
+        <a:font script="Beng" typeface="Vrinda"/>
+        <a:font script="Gujr" typeface="Shruti"/>
+        <a:font script="Khmr" typeface="DaunPenh"/>
+        <a:font script="Knda" typeface="Tunga"/>
+        <a:font script="Guru" typeface="Raavi"/>
+        <a:font script="Cans" typeface="Euphemia"/>
+        <a:font script="Cher" typeface="Plantagenet Cherokee"/>
+        <a:font script="Yiii" typeface="Microsoft Yi Baiti"/>
+        <a:font script="Tibt" typeface="Microsoft Himalaya"/>
+        <a:font script="Thaa" typeface="MV Boli"/>
+        <a:font script="Deva" typeface="Mangal"/>
+        <a:font script="Telu" typeface="Gautami"/>
+        <a:font script="Taml" typeface="Latha"/>
+        <a:font script="Syrc" typeface="Estrangelo Edessa"/>
+        <a:font script="Orya" typeface="Kalinga"/>
+        <a:font script="Mlym" typeface="Kartika"/>
+        <a:font script="Laoo" typeface="DokChampa"/>
+        <a:font script="Sinh" typeface="Iskoola Pota"/>
+        <a:font script="Mong" typeface="Mongolian Baiti"/>
+        <a:font script="Viet" typeface="Arial"/>
+        <a:font script="Uigh" typeface="Microsoft Uighur"/>
+        <a:font script="Geor" typeface="Sylfaen"/>
+      </a:minorFont>
+    </a:fontScheme>
+    <a:fmtScheme name="Office">
+      <a:fillStyleLst>
+        <a:solidFill>
+          <a:schemeClr val="phClr"/>
+        </a:solidFill>
+        <a:gradFill rotWithShape="1">
+          <a:gsLst>
+            <a:gs pos="0">
+              <a:schemeClr val="phClr">
+                <a:lumMod val="110000"/>
+                <a:satMod val="105000"/>
+                <a:tint val="67000"/>
+              </a:schemeClr>
+            </a:gs>
+            <a:gs pos="50000">
+              <a:schemeClr val="phClr">
+                <a:lumMod val="105000"/>
+                <a:satMod val="103000"/>
+                <a:tint val="73000"/>
+              </a:schemeClr>
+            </a:gs>
+            <a:gs pos="100000">
+              <a:schemeClr val="phClr">
+                <a:lumMod val="105000"/>
+                <a:satMod val="109000"/>
+                <a:tint val="81000"/>
+              </a:schemeClr>
+            </a:gs>
+          </a:gsLst>
+          <a:lin ang="5400000" scaled="0"/>
+        </a:gradFill>
+        <a:gradFill rotWithShape="1">
+          <a:gsLst>
+            <a:gs pos="0">
+              <a:schemeClr val="phClr">
+                <a:satMod val="103000"/>
+                <a:lumMod val="102000"/>
+                <a:tint val="94000"/>
+              </a:schemeClr>
+            </a:gs>
+            <a:gs pos="50000">
+              <a:schemeClr val="phClr">
+                <a:satMod val="110000"/>
+                <a:lumMod val="100000"/>
+                <a:shade val="100000"/>
+              </a:schemeClr>
+            </a:gs>
+            <a:gs pos="100000">
+              <a:schemeClr val="phClr">
+                <a:lumMod val="99000"/>
+                <a:satMod val="120000"/>
+                <a:shade val="78000"/>
+              </a:schemeClr>
+            </a:gs>
+          </a:gsLst>
+          <a:lin ang="5400000" scaled="0"/>
+        </a:gradFill>
+      </a:fillStyleLst>
+      <a:lnStyleLst>
+        <a:ln w="6350" cap="flat" cmpd="sng" algn="ctr">
+          <a:solidFill>
+            <a:schemeClr val="phClr"/>
+          </a:solidFill>
+          <a:prstDash val="solid"/>
+          <a:miter lim="800000"/>
+        </a:ln>
+        <a:ln w="12700" cap="flat" cmpd="sng" algn="ctr">
+          <a:solidFill>
+            <a:schemeClr val="phClr"/>
+          </a:solidFill>
+          <a:prstDash val="solid"/>
+          <a:miter lim="800000"/>
+        </a:ln>
+        <a:ln w="19050" cap="flat" cmpd="sng" algn="ctr">
+          <a:solidFill>
+            <a:schemeClr val="phClr"/>
+          </a:solidFill>
+          <a:prstDash val="solid"/>
+          <a:miter lim="800000"/>
+        </a:ln>
+      </a:lnStyleLst>
+      <a:effectStyleLst>
+        <a:effectStyle>
+          <a:effectLst/>
+        </a:effectStyle>
+        <a:effectStyle>
+          <a:effectLst/>
+        </a:effectStyle>
+        <a:effectStyle>
+          <a:effectLst>
+            <a:outerShdw blurRad="57150" dist="19050" dir="5400000" algn="ctr" rotWithShape="0">
+              <a:srgbClr val="000000">
+                <a:alpha val="63000"/>
+              </a:srgbClr>
+            </a:outerShdw>
+          </a:effectLst>
+        </a:effectStyle>
+      </a:effectStyleLst>
+      <a:bgFillStyleLst>
+        <a:solidFill>
+          <a:schemeClr val="phClr"/>
+        </a:solidFill>
+        <a:solidFill>
+          <a:schemeClr val="phClr">
+            <a:tint val="95000"/>
+            <a:satMod val="170000"/>
+          </a:schemeClr>
+        </a:solidFill>
+        <a:gradFill rotWithShape="1">
+          <a:gsLst>
+            <a:gs pos="0">
+              <a:schemeClr val="phClr">
+                <a:tint val="93000"/>
+                <a:satMod val="150000"/>
+                <a:shade val="98000"/>
+                <a:lumMod val="102000"/>
+              </a:schemeClr>
+            </a:gs>
+            <a:gs pos="50000">
+              <a:schemeClr val="phClr">
+                <a:tint val="98000"/>
+                <a:satMod val="130000"/>
+                <a:shade val="90000"/>
+                <a:lumMod val="103000"/>
+              </a:schemeClr>
+            </a:gs>
+            <a:gs pos="100000">
+              <a:schemeClr val="phClr">
+                <a:shade val="63000"/>
+                <a:satMod val="120000"/>
+              </a:schemeClr>
+            </a:gs>
+          </a:gsLst>
+          <a:lin ang="5400000" scaled="0"/>
+        </a:gradFill>
+      </a:bgFillStyleLst>
+    </a:fmtScheme>
+  </a:themeElements>
+  <a:objectDefaults/>
+  <a:extraClrSchemeLst/>
+  <a:extLst>
+    <a:ext uri="{05A4C25C-085E-4340-85A3-A5531E510DB2}">
+      <thm15:themeFamily xmlns:thm15="http://schemas.microsoft.com/office/thememl/2012/main" name="Office Theme" id="{62F939B6-93AF-4DB8-9C6B-D6C7DFDC589F}" vid="{4A3C46E8-61CC-4603-A589-7422A47A8E4A}"/>
+    </a:ext>
+  </a:extLst>
+</a:theme>
 </file>
</xml_diff>